<commit_message>
modified by adding my slided
</commit_message>
<xml_diff>
--- a/PPT/Group02-Component1.pptx
+++ b/PPT/Group02-Component1.pptx
@@ -16,6 +16,17 @@
     <p:sldId id="263" r:id="rId10"/>
     <p:sldId id="264" r:id="rId11"/>
     <p:sldId id="265" r:id="rId12"/>
+    <p:sldId id="267" r:id="rId13"/>
+    <p:sldId id="268" r:id="rId14"/>
+    <p:sldId id="269" r:id="rId15"/>
+    <p:sldId id="270" r:id="rId16"/>
+    <p:sldId id="271" r:id="rId17"/>
+    <p:sldId id="272" r:id="rId18"/>
+    <p:sldId id="273" r:id="rId19"/>
+    <p:sldId id="274" r:id="rId20"/>
+    <p:sldId id="275" r:id="rId21"/>
+    <p:sldId id="277" r:id="rId22"/>
+    <p:sldId id="276" r:id="rId23"/>
   </p:sldIdLst>
   <p:sldSz cx="12192000" cy="6858000"/>
   <p:notesSz cx="6858000" cy="9144000"/>
@@ -624,7 +635,7 @@
           <a:p>
             <a:fld id="{F39BF11B-9B73-4D1C-AB07-019A5A0AA27F}" type="datetimeFigureOut">
               <a:rPr lang="en-US" smtClean="0"/>
-              <a:t>9/15/2021</a:t>
+              <a:t>9/17/2021</a:t>
             </a:fld>
             <a:endParaRPr lang="en-US"/>
           </a:p>
@@ -925,7 +936,7 @@
           <a:p>
             <a:fld id="{F39BF11B-9B73-4D1C-AB07-019A5A0AA27F}" type="datetimeFigureOut">
               <a:rPr lang="en-US" smtClean="0"/>
-              <a:t>9/15/2021</a:t>
+              <a:t>9/17/2021</a:t>
             </a:fld>
             <a:endParaRPr lang="en-US"/>
           </a:p>
@@ -1173,7 +1184,7 @@
           <a:p>
             <a:fld id="{F39BF11B-9B73-4D1C-AB07-019A5A0AA27F}" type="datetimeFigureOut">
               <a:rPr lang="en-US" smtClean="0"/>
-              <a:t>9/15/2021</a:t>
+              <a:t>9/17/2021</a:t>
             </a:fld>
             <a:endParaRPr lang="en-US"/>
           </a:p>
@@ -1713,7 +1724,7 @@
           <a:p>
             <a:fld id="{F39BF11B-9B73-4D1C-AB07-019A5A0AA27F}" type="datetimeFigureOut">
               <a:rPr lang="en-US" smtClean="0"/>
-              <a:t>9/15/2021</a:t>
+              <a:t>9/17/2021</a:t>
             </a:fld>
             <a:endParaRPr lang="en-US"/>
           </a:p>
@@ -1961,7 +1972,7 @@
           <a:p>
             <a:fld id="{F39BF11B-9B73-4D1C-AB07-019A5A0AA27F}" type="datetimeFigureOut">
               <a:rPr lang="en-US" smtClean="0"/>
-              <a:t>9/15/2021</a:t>
+              <a:t>9/17/2021</a:t>
             </a:fld>
             <a:endParaRPr lang="en-US"/>
           </a:p>
@@ -2493,7 +2504,7 @@
           <a:p>
             <a:fld id="{F39BF11B-9B73-4D1C-AB07-019A5A0AA27F}" type="datetimeFigureOut">
               <a:rPr lang="en-US" smtClean="0"/>
-              <a:t>9/15/2021</a:t>
+              <a:t>9/17/2021</a:t>
             </a:fld>
             <a:endParaRPr lang="en-US"/>
           </a:p>
@@ -2790,7 +2801,7 @@
           <a:p>
             <a:fld id="{F39BF11B-9B73-4D1C-AB07-019A5A0AA27F}" type="datetimeFigureOut">
               <a:rPr lang="en-US" smtClean="0"/>
-              <a:t>9/15/2021</a:t>
+              <a:t>9/17/2021</a:t>
             </a:fld>
             <a:endParaRPr lang="en-US"/>
           </a:p>
@@ -2964,7 +2975,7 @@
           <a:p>
             <a:fld id="{F39BF11B-9B73-4D1C-AB07-019A5A0AA27F}" type="datetimeFigureOut">
               <a:rPr lang="en-US" smtClean="0"/>
-              <a:t>9/15/2021</a:t>
+              <a:t>9/17/2021</a:t>
             </a:fld>
             <a:endParaRPr lang="en-US"/>
           </a:p>
@@ -3144,7 +3155,7 @@
           <a:p>
             <a:fld id="{F39BF11B-9B73-4D1C-AB07-019A5A0AA27F}" type="datetimeFigureOut">
               <a:rPr lang="en-US" smtClean="0"/>
-              <a:t>9/15/2021</a:t>
+              <a:t>9/17/2021</a:t>
             </a:fld>
             <a:endParaRPr lang="en-US"/>
           </a:p>
@@ -3319,7 +3330,7 @@
           <a:p>
             <a:fld id="{F39BF11B-9B73-4D1C-AB07-019A5A0AA27F}" type="datetimeFigureOut">
               <a:rPr lang="en-US" smtClean="0"/>
-              <a:t>9/15/2021</a:t>
+              <a:t>9/17/2021</a:t>
             </a:fld>
             <a:endParaRPr lang="en-US"/>
           </a:p>
@@ -3570,7 +3581,7 @@
           <a:p>
             <a:fld id="{F39BF11B-9B73-4D1C-AB07-019A5A0AA27F}" type="datetimeFigureOut">
               <a:rPr lang="en-US" smtClean="0"/>
-              <a:t>9/15/2021</a:t>
+              <a:t>9/17/2021</a:t>
             </a:fld>
             <a:endParaRPr lang="en-US"/>
           </a:p>
@@ -3872,7 +3883,7 @@
           <a:p>
             <a:fld id="{F39BF11B-9B73-4D1C-AB07-019A5A0AA27F}" type="datetimeFigureOut">
               <a:rPr lang="en-US" smtClean="0"/>
-              <a:t>9/15/2021</a:t>
+              <a:t>9/17/2021</a:t>
             </a:fld>
             <a:endParaRPr lang="en-US"/>
           </a:p>
@@ -4319,7 +4330,7 @@
           <a:p>
             <a:fld id="{F39BF11B-9B73-4D1C-AB07-019A5A0AA27F}" type="datetimeFigureOut">
               <a:rPr lang="en-US" smtClean="0"/>
-              <a:t>9/15/2021</a:t>
+              <a:t>9/17/2021</a:t>
             </a:fld>
             <a:endParaRPr lang="en-US"/>
           </a:p>
@@ -4442,7 +4453,7 @@
           <a:p>
             <a:fld id="{F39BF11B-9B73-4D1C-AB07-019A5A0AA27F}" type="datetimeFigureOut">
               <a:rPr lang="en-US" smtClean="0"/>
-              <a:t>9/15/2021</a:t>
+              <a:t>9/17/2021</a:t>
             </a:fld>
             <a:endParaRPr lang="en-US"/>
           </a:p>
@@ -4537,7 +4548,7 @@
           <a:p>
             <a:fld id="{F39BF11B-9B73-4D1C-AB07-019A5A0AA27F}" type="datetimeFigureOut">
               <a:rPr lang="en-US" smtClean="0"/>
-              <a:t>9/15/2021</a:t>
+              <a:t>9/17/2021</a:t>
             </a:fld>
             <a:endParaRPr lang="en-US"/>
           </a:p>
@@ -4820,7 +4831,7 @@
           <a:p>
             <a:fld id="{F39BF11B-9B73-4D1C-AB07-019A5A0AA27F}" type="datetimeFigureOut">
               <a:rPr lang="en-US" smtClean="0"/>
-              <a:t>9/15/2021</a:t>
+              <a:t>9/17/2021</a:t>
             </a:fld>
             <a:endParaRPr lang="en-US"/>
           </a:p>
@@ -5116,7 +5127,7 @@
           <a:p>
             <a:fld id="{F39BF11B-9B73-4D1C-AB07-019A5A0AA27F}" type="datetimeFigureOut">
               <a:rPr lang="en-US" smtClean="0"/>
-              <a:t>9/15/2021</a:t>
+              <a:t>9/17/2021</a:t>
             </a:fld>
             <a:endParaRPr lang="en-US"/>
           </a:p>
@@ -5646,7 +5657,7 @@
           <a:p>
             <a:fld id="{F39BF11B-9B73-4D1C-AB07-019A5A0AA27F}" type="datetimeFigureOut">
               <a:rPr lang="en-US" smtClean="0"/>
-              <a:t>9/15/2021</a:t>
+              <a:t>9/17/2021</a:t>
             </a:fld>
             <a:endParaRPr lang="en-US"/>
           </a:p>
@@ -6241,11 +6252,7 @@
             </a:r>
             <a:r>
               <a:rPr lang="en-US" sz="4400" dirty="0" smtClean="0"/>
-              <a:t>rogramming </a:t>
-            </a:r>
-            <a:r>
-              <a:rPr lang="en-US" sz="4400" dirty="0" smtClean="0"/>
-              <a:t>Language</a:t>
+              <a:t>rogramming Language</a:t>
             </a:r>
             <a:endParaRPr lang="en-US" sz="6000" dirty="0"/>
           </a:p>
@@ -6307,20 +6314,8 @@
               </a:spcBef>
             </a:pPr>
             <a:r>
-              <a:rPr lang="en-US" sz="5600" dirty="0" err="1" smtClean="0"/>
-              <a:t>Kalyan</a:t>
-            </a:r>
-            <a:r>
               <a:rPr lang="en-US" sz="5600" dirty="0" smtClean="0"/>
-              <a:t> </a:t>
-            </a:r>
-            <a:r>
-              <a:rPr lang="en-US" sz="5600" dirty="0" err="1" smtClean="0"/>
-              <a:t>Kollepara</a:t>
-            </a:r>
-            <a:r>
-              <a:rPr lang="en-US" sz="5600" dirty="0" smtClean="0"/>
-              <a:t>, </a:t>
+              <a:t>Kalyan Kollepara, </a:t>
             </a:r>
           </a:p>
           <a:p>
@@ -7341,6 +7336,2133 @@
 </p:sld>
 </file>
 
+<file path=ppt/slides/slide12.xml><?xml version="1.0" encoding="utf-8"?>
+<p:sld xmlns:a="http://schemas.openxmlformats.org/drawingml/2006/main" xmlns:r="http://schemas.openxmlformats.org/officeDocument/2006/relationships" xmlns:p="http://schemas.openxmlformats.org/presentationml/2006/main">
+  <p:cSld>
+    <p:spTree>
+      <p:nvGrpSpPr>
+        <p:cNvPr id="1" name=""/>
+        <p:cNvGrpSpPr/>
+        <p:nvPr/>
+      </p:nvGrpSpPr>
+      <p:grpSpPr>
+        <a:xfrm>
+          <a:off x="0" y="0"/>
+          <a:ext cx="0" cy="0"/>
+          <a:chOff x="0" y="0"/>
+          <a:chExt cx="0" cy="0"/>
+        </a:xfrm>
+      </p:grpSpPr>
+      <p:sp>
+        <p:nvSpPr>
+          <p:cNvPr id="2" name="Title 1"/>
+          <p:cNvSpPr>
+            <a:spLocks noGrp="1"/>
+          </p:cNvSpPr>
+          <p:nvPr>
+            <p:ph type="title"/>
+          </p:nvPr>
+        </p:nvSpPr>
+        <p:spPr>
+          <a:xfrm>
+            <a:off x="1484311" y="685800"/>
+            <a:ext cx="10018713" cy="1293125"/>
+          </a:xfrm>
+        </p:spPr>
+        <p:txBody>
+          <a:bodyPr/>
+          <a:lstStyle/>
+          <a:p>
+            <a:r>
+              <a:rPr lang="en-IN" dirty="0" smtClean="0"/>
+              <a:t>Data Types in TypeScript</a:t>
+            </a:r>
+            <a:endParaRPr lang="en-IN" dirty="0"/>
+          </a:p>
+        </p:txBody>
+      </p:sp>
+      <p:sp>
+        <p:nvSpPr>
+          <p:cNvPr id="3" name="Content Placeholder 2"/>
+          <p:cNvSpPr>
+            <a:spLocks noGrp="1"/>
+          </p:cNvSpPr>
+          <p:nvPr>
+            <p:ph sz="half" idx="1"/>
+          </p:nvPr>
+        </p:nvSpPr>
+        <p:spPr>
+          <a:xfrm>
+            <a:off x="1484312" y="2620371"/>
+            <a:ext cx="4895055" cy="1132764"/>
+          </a:xfrm>
+        </p:spPr>
+        <p:txBody>
+          <a:bodyPr>
+            <a:normAutofit fontScale="92500" lnSpcReduction="10000"/>
+          </a:bodyPr>
+          <a:lstStyle/>
+          <a:p>
+            <a:pPr>
+              <a:buFont typeface="Wingdings" panose="05000000000000000000" pitchFamily="2" charset="2"/>
+              <a:buChar char="Ø"/>
+            </a:pPr>
+            <a:r>
+              <a:rPr lang="en-US" sz="2400" dirty="0" smtClean="0"/>
+              <a:t>Boolean:</a:t>
+            </a:r>
+            <a:endParaRPr lang="en-US" sz="2400" dirty="0"/>
+          </a:p>
+          <a:p>
+            <a:pPr lvl="1"/>
+            <a:r>
+              <a:rPr lang="en-US" sz="2000" dirty="0" smtClean="0"/>
+              <a:t>Basic </a:t>
+            </a:r>
+            <a:r>
+              <a:rPr lang="en-US" sz="2000" dirty="0" err="1" smtClean="0"/>
+              <a:t>datatype</a:t>
+            </a:r>
+            <a:r>
+              <a:rPr lang="en-US" sz="2000" dirty="0" smtClean="0"/>
+              <a:t> is the simple true/false call a Boolean .</a:t>
+            </a:r>
+            <a:endParaRPr lang="en-US" sz="2000" dirty="0"/>
+          </a:p>
+          <a:p>
+            <a:pPr lvl="1"/>
+            <a:endParaRPr lang="en-US" dirty="0"/>
+          </a:p>
+          <a:p>
+            <a:pPr marL="0" indent="0">
+              <a:buNone/>
+            </a:pPr>
+            <a:endParaRPr lang="en-IN" dirty="0"/>
+          </a:p>
+        </p:txBody>
+      </p:sp>
+      <p:sp>
+        <p:nvSpPr>
+          <p:cNvPr id="4" name="Content Placeholder 3"/>
+          <p:cNvSpPr>
+            <a:spLocks noGrp="1"/>
+          </p:cNvSpPr>
+          <p:nvPr>
+            <p:ph sz="half" idx="2"/>
+          </p:nvPr>
+        </p:nvSpPr>
+        <p:spPr>
+          <a:xfrm>
+            <a:off x="6607968" y="2438399"/>
+            <a:ext cx="4895056" cy="1137314"/>
+          </a:xfrm>
+        </p:spPr>
+        <p:txBody>
+          <a:bodyPr>
+            <a:normAutofit fontScale="92500" lnSpcReduction="10000"/>
+          </a:bodyPr>
+          <a:lstStyle/>
+          <a:p>
+            <a:pPr>
+              <a:buFont typeface="Wingdings" panose="05000000000000000000" pitchFamily="2" charset="2"/>
+              <a:buChar char="Ø"/>
+            </a:pPr>
+            <a:r>
+              <a:rPr lang="en-US" b="1" dirty="0"/>
+              <a:t>Example:</a:t>
+            </a:r>
+          </a:p>
+          <a:p>
+            <a:pPr marL="457200" lvl="1" indent="0">
+              <a:buNone/>
+            </a:pPr>
+            <a:r>
+              <a:rPr lang="en-IN" dirty="0"/>
+              <a:t>let </a:t>
+            </a:r>
+            <a:r>
+              <a:rPr lang="en-IN" dirty="0" err="1"/>
+              <a:t>isDone</a:t>
+            </a:r>
+            <a:r>
+              <a:rPr lang="en-IN" dirty="0"/>
+              <a:t>: </a:t>
+            </a:r>
+            <a:r>
+              <a:rPr lang="en-IN" dirty="0" err="1"/>
+              <a:t>boolean</a:t>
+            </a:r>
+            <a:r>
+              <a:rPr lang="en-IN" dirty="0"/>
+              <a:t> = false</a:t>
+            </a:r>
+            <a:r>
+              <a:rPr lang="en-IN" dirty="0" smtClean="0"/>
+              <a:t>;</a:t>
+            </a:r>
+            <a:endParaRPr lang="en-US" b="1" dirty="0">
+              <a:solidFill>
+                <a:schemeClr val="accent1">
+                  <a:lumMod val="50000"/>
+                </a:schemeClr>
+              </a:solidFill>
+            </a:endParaRPr>
+          </a:p>
+        </p:txBody>
+      </p:sp>
+      <p:sp>
+        <p:nvSpPr>
+          <p:cNvPr id="8" name="Rectangle 7"/>
+          <p:cNvSpPr/>
+          <p:nvPr/>
+        </p:nvSpPr>
+        <p:spPr>
+          <a:xfrm>
+            <a:off x="1484311" y="3753135"/>
+            <a:ext cx="4895056" cy="1585049"/>
+          </a:xfrm>
+          <a:prstGeom prst="rect">
+            <a:avLst/>
+          </a:prstGeom>
+        </p:spPr>
+        <p:txBody>
+          <a:bodyPr wrap="square">
+            <a:spAutoFit/>
+          </a:bodyPr>
+          <a:lstStyle/>
+          <a:p>
+            <a:pPr indent="-285750" defTabSz="457200">
+              <a:lnSpc>
+                <a:spcPct val="90000"/>
+              </a:lnSpc>
+              <a:spcBef>
+                <a:spcPct val="20000"/>
+              </a:spcBef>
+              <a:spcAft>
+                <a:spcPts val="600"/>
+              </a:spcAft>
+              <a:buClr>
+                <a:schemeClr val="accent1">
+                  <a:lumMod val="75000"/>
+                </a:schemeClr>
+              </a:buClr>
+              <a:buSzPct val="145000"/>
+              <a:buFont typeface="Wingdings" panose="05000000000000000000" pitchFamily="2" charset="2"/>
+              <a:buChar char="Ø"/>
+            </a:pPr>
+            <a:r>
+              <a:rPr lang="en-US" sz="2200" dirty="0"/>
+              <a:t>Number</a:t>
+            </a:r>
+            <a:endParaRPr lang="en-US" sz="2200" dirty="0"/>
+          </a:p>
+          <a:p>
+            <a:pPr marL="742950" lvl="1" indent="-285750" defTabSz="457200">
+              <a:lnSpc>
+                <a:spcPct val="90000"/>
+              </a:lnSpc>
+              <a:spcBef>
+                <a:spcPct val="20000"/>
+              </a:spcBef>
+              <a:spcAft>
+                <a:spcPts val="600"/>
+              </a:spcAft>
+              <a:buClr>
+                <a:schemeClr val="accent1">
+                  <a:lumMod val="75000"/>
+                </a:schemeClr>
+              </a:buClr>
+              <a:buSzPct val="145000"/>
+              <a:buFont typeface="Arial"/>
+              <a:buChar char="•"/>
+            </a:pPr>
+            <a:r>
+              <a:rPr lang="en-IN" sz="1900" dirty="0"/>
+              <a:t>TypeScript are either floating point values or </a:t>
+            </a:r>
+            <a:r>
+              <a:rPr lang="en-IN" sz="1900" dirty="0" err="1"/>
+              <a:t>BigIntegers</a:t>
+            </a:r>
+            <a:r>
+              <a:rPr lang="en-IN" sz="1900" dirty="0"/>
+              <a:t>. These floating point numbers get the type number, while </a:t>
+            </a:r>
+            <a:r>
+              <a:rPr lang="en-IN" sz="1900" dirty="0" err="1"/>
+              <a:t>BigIntegers</a:t>
+            </a:r>
+            <a:r>
+              <a:rPr lang="en-IN" sz="1900" dirty="0"/>
+              <a:t> get the type </a:t>
+            </a:r>
+            <a:r>
+              <a:rPr lang="en-IN" sz="1900" dirty="0" err="1"/>
+              <a:t>bigint</a:t>
+            </a:r>
+            <a:r>
+              <a:rPr lang="en-IN" sz="1900" dirty="0"/>
+              <a:t>.</a:t>
+            </a:r>
+            <a:endParaRPr lang="en-US" sz="1900" dirty="0"/>
+          </a:p>
+        </p:txBody>
+      </p:sp>
+      <p:sp>
+        <p:nvSpPr>
+          <p:cNvPr id="10" name="Rectangle 9"/>
+          <p:cNvSpPr/>
+          <p:nvPr/>
+        </p:nvSpPr>
+        <p:spPr>
+          <a:xfrm>
+            <a:off x="6607968" y="3753135"/>
+            <a:ext cx="4293182" cy="1982081"/>
+          </a:xfrm>
+          <a:prstGeom prst="rect">
+            <a:avLst/>
+          </a:prstGeom>
+        </p:spPr>
+        <p:txBody>
+          <a:bodyPr wrap="square">
+            <a:spAutoFit/>
+          </a:bodyPr>
+          <a:lstStyle/>
+          <a:p>
+            <a:pPr defTabSz="457200">
+              <a:lnSpc>
+                <a:spcPct val="90000"/>
+              </a:lnSpc>
+              <a:spcBef>
+                <a:spcPct val="20000"/>
+              </a:spcBef>
+              <a:spcAft>
+                <a:spcPts val="600"/>
+              </a:spcAft>
+              <a:buClr>
+                <a:schemeClr val="accent1">
+                  <a:lumMod val="75000"/>
+                </a:schemeClr>
+              </a:buClr>
+              <a:buSzPct val="145000"/>
+              <a:buFont typeface="Wingdings" panose="05000000000000000000" pitchFamily="2" charset="2"/>
+              <a:buChar char="Ø"/>
+            </a:pPr>
+            <a:r>
+              <a:rPr lang="en-US" sz="1700" b="1" dirty="0"/>
+              <a:t>Example:</a:t>
+            </a:r>
+          </a:p>
+          <a:p>
+            <a:pPr lvl="1" defTabSz="457200">
+              <a:lnSpc>
+                <a:spcPct val="90000"/>
+              </a:lnSpc>
+              <a:spcBef>
+                <a:spcPct val="20000"/>
+              </a:spcBef>
+              <a:spcAft>
+                <a:spcPts val="600"/>
+              </a:spcAft>
+              <a:buClr>
+                <a:schemeClr val="accent1">
+                  <a:lumMod val="75000"/>
+                </a:schemeClr>
+              </a:buClr>
+              <a:buSzPct val="145000"/>
+            </a:pPr>
+            <a:r>
+              <a:rPr lang="en-IN" sz="1500" dirty="0"/>
+              <a:t>let decimal: number = 6;</a:t>
+            </a:r>
+          </a:p>
+          <a:p>
+            <a:pPr lvl="1" defTabSz="457200">
+              <a:lnSpc>
+                <a:spcPct val="90000"/>
+              </a:lnSpc>
+              <a:spcBef>
+                <a:spcPct val="20000"/>
+              </a:spcBef>
+              <a:spcAft>
+                <a:spcPts val="600"/>
+              </a:spcAft>
+              <a:buClr>
+                <a:schemeClr val="accent1">
+                  <a:lumMod val="75000"/>
+                </a:schemeClr>
+              </a:buClr>
+              <a:buSzPct val="145000"/>
+            </a:pPr>
+            <a:r>
+              <a:rPr lang="en-IN" sz="1500" dirty="0"/>
+              <a:t>let hex: number = 0xf00d;</a:t>
+            </a:r>
+          </a:p>
+          <a:p>
+            <a:pPr lvl="1" defTabSz="457200">
+              <a:lnSpc>
+                <a:spcPct val="90000"/>
+              </a:lnSpc>
+              <a:spcBef>
+                <a:spcPct val="20000"/>
+              </a:spcBef>
+              <a:spcAft>
+                <a:spcPts val="600"/>
+              </a:spcAft>
+              <a:buClr>
+                <a:schemeClr val="accent1">
+                  <a:lumMod val="75000"/>
+                </a:schemeClr>
+              </a:buClr>
+              <a:buSzPct val="145000"/>
+            </a:pPr>
+            <a:r>
+              <a:rPr lang="en-IN" sz="1500" dirty="0"/>
+              <a:t>let binary: number = 0b1010;</a:t>
+            </a:r>
+          </a:p>
+          <a:p>
+            <a:pPr lvl="1" defTabSz="457200">
+              <a:lnSpc>
+                <a:spcPct val="90000"/>
+              </a:lnSpc>
+              <a:spcBef>
+                <a:spcPct val="20000"/>
+              </a:spcBef>
+              <a:spcAft>
+                <a:spcPts val="600"/>
+              </a:spcAft>
+              <a:buClr>
+                <a:schemeClr val="accent1">
+                  <a:lumMod val="75000"/>
+                </a:schemeClr>
+              </a:buClr>
+              <a:buSzPct val="145000"/>
+            </a:pPr>
+            <a:r>
+              <a:rPr lang="en-IN" sz="1500" dirty="0"/>
+              <a:t>let octal: number = 0o744;</a:t>
+            </a:r>
+          </a:p>
+          <a:p>
+            <a:pPr lvl="1" defTabSz="457200">
+              <a:lnSpc>
+                <a:spcPct val="90000"/>
+              </a:lnSpc>
+              <a:spcBef>
+                <a:spcPct val="20000"/>
+              </a:spcBef>
+              <a:spcAft>
+                <a:spcPts val="600"/>
+              </a:spcAft>
+              <a:buClr>
+                <a:schemeClr val="accent1">
+                  <a:lumMod val="75000"/>
+                </a:schemeClr>
+              </a:buClr>
+              <a:buSzPct val="145000"/>
+            </a:pPr>
+            <a:r>
+              <a:rPr lang="en-IN" sz="1500" dirty="0"/>
+              <a:t>let big: </a:t>
+            </a:r>
+            <a:r>
+              <a:rPr lang="en-IN" sz="1500" dirty="0" err="1"/>
+              <a:t>bigint</a:t>
+            </a:r>
+            <a:r>
+              <a:rPr lang="en-IN" sz="1500" dirty="0"/>
+              <a:t> = 100n</a:t>
+            </a:r>
+            <a:r>
+              <a:rPr lang="en-IN" sz="1500" dirty="0" smtClean="0"/>
+              <a:t>;</a:t>
+            </a:r>
+            <a:endParaRPr lang="en-US" b="1" dirty="0">
+              <a:solidFill>
+                <a:schemeClr val="accent1">
+                  <a:lumMod val="50000"/>
+                </a:schemeClr>
+              </a:solidFill>
+            </a:endParaRPr>
+          </a:p>
+        </p:txBody>
+      </p:sp>
+    </p:spTree>
+    <p:extLst>
+      <p:ext uri="{BB962C8B-B14F-4D97-AF65-F5344CB8AC3E}">
+        <p14:creationId xmlns:p14="http://schemas.microsoft.com/office/powerpoint/2010/main" val="4220985627"/>
+      </p:ext>
+    </p:extLst>
+  </p:cSld>
+  <p:clrMapOvr>
+    <a:masterClrMapping/>
+  </p:clrMapOvr>
+</p:sld>
+</file>
+
+<file path=ppt/slides/slide13.xml><?xml version="1.0" encoding="utf-8"?>
+<p:sld xmlns:a="http://schemas.openxmlformats.org/drawingml/2006/main" xmlns:r="http://schemas.openxmlformats.org/officeDocument/2006/relationships" xmlns:p="http://schemas.openxmlformats.org/presentationml/2006/main">
+  <p:cSld>
+    <p:spTree>
+      <p:nvGrpSpPr>
+        <p:cNvPr id="1" name=""/>
+        <p:cNvGrpSpPr/>
+        <p:nvPr/>
+      </p:nvGrpSpPr>
+      <p:grpSpPr>
+        <a:xfrm>
+          <a:off x="0" y="0"/>
+          <a:ext cx="0" cy="0"/>
+          <a:chOff x="0" y="0"/>
+          <a:chExt cx="0" cy="0"/>
+        </a:xfrm>
+      </p:grpSpPr>
+      <p:sp>
+        <p:nvSpPr>
+          <p:cNvPr id="2" name="Title 1"/>
+          <p:cNvSpPr>
+            <a:spLocks noGrp="1"/>
+          </p:cNvSpPr>
+          <p:nvPr>
+            <p:ph type="title"/>
+          </p:nvPr>
+        </p:nvSpPr>
+        <p:spPr>
+          <a:xfrm>
+            <a:off x="1484311" y="685800"/>
+            <a:ext cx="10018713" cy="1293125"/>
+          </a:xfrm>
+        </p:spPr>
+        <p:txBody>
+          <a:bodyPr/>
+          <a:lstStyle/>
+          <a:p>
+            <a:r>
+              <a:rPr lang="en-IN" dirty="0" smtClean="0"/>
+              <a:t>Data Types in TypeScript</a:t>
+            </a:r>
+            <a:endParaRPr lang="en-IN" dirty="0"/>
+          </a:p>
+        </p:txBody>
+      </p:sp>
+      <p:sp>
+        <p:nvSpPr>
+          <p:cNvPr id="3" name="Content Placeholder 2"/>
+          <p:cNvSpPr>
+            <a:spLocks noGrp="1"/>
+          </p:cNvSpPr>
+          <p:nvPr>
+            <p:ph sz="half" idx="1"/>
+          </p:nvPr>
+        </p:nvSpPr>
+        <p:spPr>
+          <a:xfrm>
+            <a:off x="1484312" y="1978925"/>
+            <a:ext cx="4861897" cy="3903260"/>
+          </a:xfrm>
+        </p:spPr>
+        <p:txBody>
+          <a:bodyPr>
+            <a:normAutofit/>
+          </a:bodyPr>
+          <a:lstStyle/>
+          <a:p>
+            <a:pPr>
+              <a:lnSpc>
+                <a:spcPct val="110000"/>
+              </a:lnSpc>
+              <a:buFont typeface="Wingdings" panose="05000000000000000000" pitchFamily="2" charset="2"/>
+              <a:buChar char="Ø"/>
+            </a:pPr>
+            <a:r>
+              <a:rPr lang="en-US" sz="2800" dirty="0"/>
+              <a:t>String:</a:t>
+            </a:r>
+            <a:endParaRPr lang="en-US" sz="2800" dirty="0"/>
+          </a:p>
+          <a:p>
+            <a:pPr lvl="1"/>
+            <a:r>
+              <a:rPr lang="en-IN" sz="1900" dirty="0"/>
+              <a:t>Fundamental part of creating programs in TypeScript is working with textual data</a:t>
+            </a:r>
+            <a:r>
+              <a:rPr lang="en-IN" sz="1900" dirty="0" smtClean="0"/>
+              <a:t>. As </a:t>
+            </a:r>
+            <a:r>
+              <a:rPr lang="en-IN" sz="1900" dirty="0"/>
+              <a:t>in other languages, we use the type string to refer to these textual datatypes</a:t>
+            </a:r>
+            <a:r>
+              <a:rPr lang="en-IN" sz="1900" dirty="0" smtClean="0"/>
+              <a:t>. TypeScript </a:t>
+            </a:r>
+            <a:r>
+              <a:rPr lang="en-IN" sz="1900" dirty="0"/>
+              <a:t>also uses double quotes (") or single quotes (') to surround string data</a:t>
+            </a:r>
+            <a:r>
+              <a:rPr lang="en-IN" sz="1900" dirty="0"/>
+              <a:t>.</a:t>
+            </a:r>
+            <a:endParaRPr lang="en-US" sz="1900" dirty="0"/>
+          </a:p>
+          <a:p>
+            <a:pPr marL="0" indent="0">
+              <a:buNone/>
+            </a:pPr>
+            <a:endParaRPr lang="en-IN" dirty="0"/>
+          </a:p>
+        </p:txBody>
+      </p:sp>
+      <p:sp>
+        <p:nvSpPr>
+          <p:cNvPr id="4" name="Content Placeholder 3"/>
+          <p:cNvSpPr>
+            <a:spLocks noGrp="1"/>
+          </p:cNvSpPr>
+          <p:nvPr>
+            <p:ph sz="half" idx="2"/>
+          </p:nvPr>
+        </p:nvSpPr>
+        <p:spPr>
+          <a:xfrm>
+            <a:off x="6607968" y="1978925"/>
+            <a:ext cx="4895056" cy="3903260"/>
+          </a:xfrm>
+        </p:spPr>
+        <p:txBody>
+          <a:bodyPr>
+            <a:normAutofit/>
+          </a:bodyPr>
+          <a:lstStyle/>
+          <a:p>
+            <a:pPr>
+              <a:buFont typeface="Wingdings" panose="05000000000000000000" pitchFamily="2" charset="2"/>
+              <a:buChar char="Ø"/>
+            </a:pPr>
+            <a:r>
+              <a:rPr lang="en-US" b="1" dirty="0"/>
+              <a:t>Example:</a:t>
+            </a:r>
+          </a:p>
+          <a:p>
+            <a:r>
+              <a:rPr lang="en-IN" dirty="0"/>
+              <a:t>let </a:t>
+            </a:r>
+            <a:r>
+              <a:rPr lang="en-IN" dirty="0" err="1"/>
+              <a:t>fullName</a:t>
+            </a:r>
+            <a:r>
+              <a:rPr lang="en-IN" dirty="0"/>
+              <a:t>: string = `Bob </a:t>
+            </a:r>
+            <a:r>
+              <a:rPr lang="en-IN" dirty="0" err="1"/>
+              <a:t>Bobbington</a:t>
+            </a:r>
+            <a:r>
+              <a:rPr lang="en-IN" dirty="0"/>
+              <a:t>`;</a:t>
+            </a:r>
+          </a:p>
+          <a:p>
+            <a:r>
+              <a:rPr lang="en-IN" dirty="0" smtClean="0"/>
+              <a:t>let </a:t>
+            </a:r>
+            <a:r>
+              <a:rPr lang="en-IN" dirty="0"/>
+              <a:t>sentence: string = `Hello, my name is ${</a:t>
+            </a:r>
+            <a:r>
+              <a:rPr lang="en-IN" dirty="0" err="1"/>
+              <a:t>fullName</a:t>
+            </a:r>
+            <a:r>
+              <a:rPr lang="en-IN" dirty="0"/>
+              <a:t>}.</a:t>
+            </a:r>
+          </a:p>
+        </p:txBody>
+      </p:sp>
+    </p:spTree>
+    <p:extLst>
+      <p:ext uri="{BB962C8B-B14F-4D97-AF65-F5344CB8AC3E}">
+        <p14:creationId xmlns:p14="http://schemas.microsoft.com/office/powerpoint/2010/main" val="3597120724"/>
+      </p:ext>
+    </p:extLst>
+  </p:cSld>
+  <p:clrMapOvr>
+    <a:masterClrMapping/>
+  </p:clrMapOvr>
+</p:sld>
+</file>
+
+<file path=ppt/slides/slide14.xml><?xml version="1.0" encoding="utf-8"?>
+<p:sld xmlns:a="http://schemas.openxmlformats.org/drawingml/2006/main" xmlns:r="http://schemas.openxmlformats.org/officeDocument/2006/relationships" xmlns:p="http://schemas.openxmlformats.org/presentationml/2006/main">
+  <p:cSld>
+    <p:spTree>
+      <p:nvGrpSpPr>
+        <p:cNvPr id="1" name=""/>
+        <p:cNvGrpSpPr/>
+        <p:nvPr/>
+      </p:nvGrpSpPr>
+      <p:grpSpPr>
+        <a:xfrm>
+          <a:off x="0" y="0"/>
+          <a:ext cx="0" cy="0"/>
+          <a:chOff x="0" y="0"/>
+          <a:chExt cx="0" cy="0"/>
+        </a:xfrm>
+      </p:grpSpPr>
+      <p:sp>
+        <p:nvSpPr>
+          <p:cNvPr id="2" name="Title 1"/>
+          <p:cNvSpPr>
+            <a:spLocks noGrp="1"/>
+          </p:cNvSpPr>
+          <p:nvPr>
+            <p:ph type="title"/>
+          </p:nvPr>
+        </p:nvSpPr>
+        <p:spPr>
+          <a:xfrm>
+            <a:off x="1484311" y="685800"/>
+            <a:ext cx="10018713" cy="1293125"/>
+          </a:xfrm>
+        </p:spPr>
+        <p:txBody>
+          <a:bodyPr/>
+          <a:lstStyle/>
+          <a:p>
+            <a:r>
+              <a:rPr lang="en-IN" dirty="0" smtClean="0"/>
+              <a:t>Data Types in TypeScript</a:t>
+            </a:r>
+            <a:endParaRPr lang="en-IN" dirty="0"/>
+          </a:p>
+        </p:txBody>
+      </p:sp>
+      <p:sp>
+        <p:nvSpPr>
+          <p:cNvPr id="3" name="Content Placeholder 2"/>
+          <p:cNvSpPr>
+            <a:spLocks noGrp="1"/>
+          </p:cNvSpPr>
+          <p:nvPr>
+            <p:ph sz="half" idx="1"/>
+          </p:nvPr>
+        </p:nvSpPr>
+        <p:spPr>
+          <a:xfrm>
+            <a:off x="1484312" y="1978925"/>
+            <a:ext cx="4861897" cy="3903260"/>
+          </a:xfrm>
+        </p:spPr>
+        <p:txBody>
+          <a:bodyPr>
+            <a:normAutofit/>
+          </a:bodyPr>
+          <a:lstStyle/>
+          <a:p>
+            <a:pPr>
+              <a:lnSpc>
+                <a:spcPct val="110000"/>
+              </a:lnSpc>
+              <a:buFont typeface="Wingdings" panose="05000000000000000000" pitchFamily="2" charset="2"/>
+              <a:buChar char="Ø"/>
+            </a:pPr>
+            <a:r>
+              <a:rPr lang="en-US" sz="2800" dirty="0" smtClean="0"/>
+              <a:t>Array:</a:t>
+            </a:r>
+            <a:endParaRPr lang="en-US" sz="2800" dirty="0"/>
+          </a:p>
+          <a:p>
+            <a:pPr lvl="1"/>
+            <a:r>
+              <a:rPr lang="en-IN" sz="1900" dirty="0"/>
+              <a:t>TypeScript allows you to work with arrays of values. Array types can be written in one of two ways. </a:t>
+            </a:r>
+            <a:endParaRPr lang="en-IN" sz="1900" dirty="0" smtClean="0"/>
+          </a:p>
+          <a:p>
+            <a:pPr lvl="1"/>
+            <a:r>
+              <a:rPr lang="en-IN" sz="1900" dirty="0" smtClean="0"/>
+              <a:t>In </a:t>
+            </a:r>
+            <a:r>
+              <a:rPr lang="en-IN" sz="1900" dirty="0"/>
+              <a:t>the first, you use the type of the elements followed by [] to denote an array of </a:t>
+            </a:r>
+            <a:r>
+              <a:rPr lang="en-IN" sz="1900" dirty="0" smtClean="0"/>
+              <a:t>that </a:t>
+            </a:r>
+            <a:r>
+              <a:rPr lang="en-IN" sz="1900" dirty="0"/>
+              <a:t>element type</a:t>
+            </a:r>
+            <a:r>
+              <a:rPr lang="en-IN" sz="1900" dirty="0" smtClean="0"/>
+              <a:t>:</a:t>
+            </a:r>
+          </a:p>
+          <a:p>
+            <a:pPr lvl="1"/>
+            <a:r>
+              <a:rPr lang="en-IN" sz="1900" dirty="0"/>
+              <a:t>The second way uses a generic array type, Array&lt;</a:t>
+            </a:r>
+            <a:r>
+              <a:rPr lang="en-IN" sz="1900" dirty="0" err="1"/>
+              <a:t>elemType</a:t>
+            </a:r>
+            <a:r>
+              <a:rPr lang="en-IN" sz="1900" dirty="0"/>
+              <a:t>&gt;:</a:t>
+            </a:r>
+          </a:p>
+        </p:txBody>
+      </p:sp>
+      <p:sp>
+        <p:nvSpPr>
+          <p:cNvPr id="4" name="Content Placeholder 3"/>
+          <p:cNvSpPr>
+            <a:spLocks noGrp="1"/>
+          </p:cNvSpPr>
+          <p:nvPr>
+            <p:ph sz="half" idx="2"/>
+          </p:nvPr>
+        </p:nvSpPr>
+        <p:spPr>
+          <a:xfrm>
+            <a:off x="6607968" y="1978925"/>
+            <a:ext cx="4895056" cy="3903260"/>
+          </a:xfrm>
+        </p:spPr>
+        <p:txBody>
+          <a:bodyPr>
+            <a:normAutofit/>
+          </a:bodyPr>
+          <a:lstStyle/>
+          <a:p>
+            <a:pPr>
+              <a:buFont typeface="Wingdings" panose="05000000000000000000" pitchFamily="2" charset="2"/>
+              <a:buChar char="Ø"/>
+            </a:pPr>
+            <a:r>
+              <a:rPr lang="en-US" b="1" dirty="0"/>
+              <a:t>Example:</a:t>
+            </a:r>
+          </a:p>
+          <a:p>
+            <a:r>
+              <a:rPr lang="en-IN" dirty="0"/>
+              <a:t>let list: number[] = [1, 2, 3];</a:t>
+            </a:r>
+          </a:p>
+          <a:p>
+            <a:r>
+              <a:rPr lang="en-IN" dirty="0"/>
+              <a:t>let list: Array&lt;number&gt; = [1, 2, 3];</a:t>
+            </a:r>
+            <a:endParaRPr lang="en-IN" dirty="0"/>
+          </a:p>
+        </p:txBody>
+      </p:sp>
+    </p:spTree>
+    <p:extLst>
+      <p:ext uri="{BB962C8B-B14F-4D97-AF65-F5344CB8AC3E}">
+        <p14:creationId xmlns:p14="http://schemas.microsoft.com/office/powerpoint/2010/main" val="4266511691"/>
+      </p:ext>
+    </p:extLst>
+  </p:cSld>
+  <p:clrMapOvr>
+    <a:masterClrMapping/>
+  </p:clrMapOvr>
+</p:sld>
+</file>
+
+<file path=ppt/slides/slide15.xml><?xml version="1.0" encoding="utf-8"?>
+<p:sld xmlns:a="http://schemas.openxmlformats.org/drawingml/2006/main" xmlns:r="http://schemas.openxmlformats.org/officeDocument/2006/relationships" xmlns:p="http://schemas.openxmlformats.org/presentationml/2006/main">
+  <p:cSld>
+    <p:spTree>
+      <p:nvGrpSpPr>
+        <p:cNvPr id="1" name=""/>
+        <p:cNvGrpSpPr/>
+        <p:nvPr/>
+      </p:nvGrpSpPr>
+      <p:grpSpPr>
+        <a:xfrm>
+          <a:off x="0" y="0"/>
+          <a:ext cx="0" cy="0"/>
+          <a:chOff x="0" y="0"/>
+          <a:chExt cx="0" cy="0"/>
+        </a:xfrm>
+      </p:grpSpPr>
+      <p:sp>
+        <p:nvSpPr>
+          <p:cNvPr id="2" name="Title 1"/>
+          <p:cNvSpPr>
+            <a:spLocks noGrp="1"/>
+          </p:cNvSpPr>
+          <p:nvPr>
+            <p:ph type="title"/>
+          </p:nvPr>
+        </p:nvSpPr>
+        <p:spPr>
+          <a:xfrm>
+            <a:off x="1484311" y="685800"/>
+            <a:ext cx="10018713" cy="1293125"/>
+          </a:xfrm>
+        </p:spPr>
+        <p:txBody>
+          <a:bodyPr/>
+          <a:lstStyle/>
+          <a:p>
+            <a:r>
+              <a:rPr lang="en-IN" dirty="0" smtClean="0"/>
+              <a:t>Data Types in TypeScript</a:t>
+            </a:r>
+            <a:endParaRPr lang="en-IN" dirty="0"/>
+          </a:p>
+        </p:txBody>
+      </p:sp>
+      <p:sp>
+        <p:nvSpPr>
+          <p:cNvPr id="3" name="Content Placeholder 2"/>
+          <p:cNvSpPr>
+            <a:spLocks noGrp="1"/>
+          </p:cNvSpPr>
+          <p:nvPr>
+            <p:ph sz="half" idx="1"/>
+          </p:nvPr>
+        </p:nvSpPr>
+        <p:spPr>
+          <a:xfrm>
+            <a:off x="1484312" y="1978925"/>
+            <a:ext cx="4861897" cy="3903260"/>
+          </a:xfrm>
+        </p:spPr>
+        <p:txBody>
+          <a:bodyPr>
+            <a:normAutofit/>
+          </a:bodyPr>
+          <a:lstStyle/>
+          <a:p>
+            <a:pPr>
+              <a:lnSpc>
+                <a:spcPct val="110000"/>
+              </a:lnSpc>
+              <a:buFont typeface="Wingdings" panose="05000000000000000000" pitchFamily="2" charset="2"/>
+              <a:buChar char="Ø"/>
+            </a:pPr>
+            <a:r>
+              <a:rPr lang="en-US" sz="2800" dirty="0" smtClean="0"/>
+              <a:t>Tuple:</a:t>
+            </a:r>
+            <a:endParaRPr lang="en-US" sz="2800" dirty="0"/>
+          </a:p>
+          <a:p>
+            <a:pPr lvl="1"/>
+            <a:r>
+              <a:rPr lang="en-IN" sz="1900" dirty="0"/>
+              <a:t>Tuple types allow you to express an array with a fixed number of elements whose types are known, but need not be the same. </a:t>
+            </a:r>
+            <a:endParaRPr lang="en-IN" sz="1900" dirty="0" smtClean="0"/>
+          </a:p>
+          <a:p>
+            <a:pPr lvl="1"/>
+            <a:r>
+              <a:rPr lang="en-IN" sz="1900" dirty="0"/>
+              <a:t>For example, you may want to represent a value as a pair of a string and a number:</a:t>
+            </a:r>
+            <a:endParaRPr lang="en-IN" sz="1900" dirty="0" smtClean="0"/>
+          </a:p>
+        </p:txBody>
+      </p:sp>
+      <p:sp>
+        <p:nvSpPr>
+          <p:cNvPr id="4" name="Content Placeholder 3"/>
+          <p:cNvSpPr>
+            <a:spLocks noGrp="1"/>
+          </p:cNvSpPr>
+          <p:nvPr>
+            <p:ph sz="half" idx="2"/>
+          </p:nvPr>
+        </p:nvSpPr>
+        <p:spPr>
+          <a:xfrm>
+            <a:off x="6607968" y="1978925"/>
+            <a:ext cx="4895056" cy="3903260"/>
+          </a:xfrm>
+        </p:spPr>
+        <p:txBody>
+          <a:bodyPr>
+            <a:normAutofit/>
+          </a:bodyPr>
+          <a:lstStyle/>
+          <a:p>
+            <a:pPr>
+              <a:buFont typeface="Wingdings" panose="05000000000000000000" pitchFamily="2" charset="2"/>
+              <a:buChar char="Ø"/>
+            </a:pPr>
+            <a:r>
+              <a:rPr lang="en-US" b="1" dirty="0"/>
+              <a:t>Example:</a:t>
+            </a:r>
+          </a:p>
+          <a:p>
+            <a:pPr marL="0" indent="0">
+              <a:buNone/>
+            </a:pPr>
+            <a:r>
+              <a:rPr lang="en-IN" dirty="0"/>
+              <a:t>// Declare a tuple type</a:t>
+            </a:r>
+          </a:p>
+          <a:p>
+            <a:r>
+              <a:rPr lang="en-IN" dirty="0"/>
+              <a:t>let x: [string, number];</a:t>
+            </a:r>
+          </a:p>
+          <a:p>
+            <a:pPr marL="0" indent="0">
+              <a:buNone/>
+            </a:pPr>
+            <a:r>
+              <a:rPr lang="en-IN" dirty="0"/>
+              <a:t>// Initialize it</a:t>
+            </a:r>
+          </a:p>
+          <a:p>
+            <a:r>
+              <a:rPr lang="en-IN" dirty="0"/>
+              <a:t>x = ["hello", 10]; // OK</a:t>
+            </a:r>
+          </a:p>
+          <a:p>
+            <a:pPr marL="0" indent="0">
+              <a:buNone/>
+            </a:pPr>
+            <a:r>
+              <a:rPr lang="en-IN" dirty="0"/>
+              <a:t>// Initialize it incorrectly</a:t>
+            </a:r>
+          </a:p>
+          <a:p>
+            <a:r>
+              <a:rPr lang="en-IN" dirty="0"/>
+              <a:t>x = [10, "hello"]; // Error</a:t>
+            </a:r>
+            <a:endParaRPr lang="en-IN" dirty="0"/>
+          </a:p>
+        </p:txBody>
+      </p:sp>
+    </p:spTree>
+    <p:extLst>
+      <p:ext uri="{BB962C8B-B14F-4D97-AF65-F5344CB8AC3E}">
+        <p14:creationId xmlns:p14="http://schemas.microsoft.com/office/powerpoint/2010/main" val="1552842282"/>
+      </p:ext>
+    </p:extLst>
+  </p:cSld>
+  <p:clrMapOvr>
+    <a:masterClrMapping/>
+  </p:clrMapOvr>
+</p:sld>
+</file>
+
+<file path=ppt/slides/slide16.xml><?xml version="1.0" encoding="utf-8"?>
+<p:sld xmlns:a="http://schemas.openxmlformats.org/drawingml/2006/main" xmlns:r="http://schemas.openxmlformats.org/officeDocument/2006/relationships" xmlns:p="http://schemas.openxmlformats.org/presentationml/2006/main">
+  <p:cSld>
+    <p:spTree>
+      <p:nvGrpSpPr>
+        <p:cNvPr id="1" name=""/>
+        <p:cNvGrpSpPr/>
+        <p:nvPr/>
+      </p:nvGrpSpPr>
+      <p:grpSpPr>
+        <a:xfrm>
+          <a:off x="0" y="0"/>
+          <a:ext cx="0" cy="0"/>
+          <a:chOff x="0" y="0"/>
+          <a:chExt cx="0" cy="0"/>
+        </a:xfrm>
+      </p:grpSpPr>
+      <p:sp>
+        <p:nvSpPr>
+          <p:cNvPr id="2" name="Title 1"/>
+          <p:cNvSpPr>
+            <a:spLocks noGrp="1"/>
+          </p:cNvSpPr>
+          <p:nvPr>
+            <p:ph type="title"/>
+          </p:nvPr>
+        </p:nvSpPr>
+        <p:spPr>
+          <a:xfrm>
+            <a:off x="1484311" y="685800"/>
+            <a:ext cx="10018713" cy="1293125"/>
+          </a:xfrm>
+        </p:spPr>
+        <p:txBody>
+          <a:bodyPr/>
+          <a:lstStyle/>
+          <a:p>
+            <a:r>
+              <a:rPr lang="en-IN" dirty="0" smtClean="0"/>
+              <a:t>Data Types in TypeScript</a:t>
+            </a:r>
+            <a:endParaRPr lang="en-IN" dirty="0"/>
+          </a:p>
+        </p:txBody>
+      </p:sp>
+      <p:sp>
+        <p:nvSpPr>
+          <p:cNvPr id="3" name="Content Placeholder 2"/>
+          <p:cNvSpPr>
+            <a:spLocks noGrp="1"/>
+          </p:cNvSpPr>
+          <p:nvPr>
+            <p:ph sz="half" idx="1"/>
+          </p:nvPr>
+        </p:nvSpPr>
+        <p:spPr>
+          <a:xfrm>
+            <a:off x="1484312" y="1978925"/>
+            <a:ext cx="4861897" cy="3903260"/>
+          </a:xfrm>
+        </p:spPr>
+        <p:txBody>
+          <a:bodyPr>
+            <a:normAutofit/>
+          </a:bodyPr>
+          <a:lstStyle/>
+          <a:p>
+            <a:pPr>
+              <a:lnSpc>
+                <a:spcPct val="110000"/>
+              </a:lnSpc>
+              <a:buFont typeface="Wingdings" panose="05000000000000000000" pitchFamily="2" charset="2"/>
+              <a:buChar char="Ø"/>
+            </a:pPr>
+            <a:r>
+              <a:rPr lang="en-US" sz="2800" dirty="0" err="1" smtClean="0"/>
+              <a:t>Enum</a:t>
+            </a:r>
+            <a:r>
+              <a:rPr lang="en-US" sz="2800" dirty="0" smtClean="0"/>
+              <a:t>:</a:t>
+            </a:r>
+            <a:endParaRPr lang="en-US" sz="2800" dirty="0"/>
+          </a:p>
+          <a:p>
+            <a:pPr lvl="1"/>
+            <a:r>
+              <a:rPr lang="en-IN" sz="1900" dirty="0"/>
+              <a:t>A helpful addition to the standard set of datatypes from JavaScript is the </a:t>
+            </a:r>
+            <a:r>
+              <a:rPr lang="en-IN" sz="1900" dirty="0" err="1"/>
+              <a:t>enum</a:t>
+            </a:r>
+            <a:r>
+              <a:rPr lang="en-IN" sz="1900" dirty="0"/>
+              <a:t>. As in languages like C#, an </a:t>
+            </a:r>
+            <a:r>
+              <a:rPr lang="en-IN" sz="1900" dirty="0" err="1"/>
+              <a:t>enum</a:t>
+            </a:r>
+            <a:r>
+              <a:rPr lang="en-IN" sz="1900" dirty="0"/>
+              <a:t> is a way of giving more friendly names to sets of numeric values</a:t>
+            </a:r>
+            <a:r>
+              <a:rPr lang="en-IN" sz="1900" dirty="0" smtClean="0"/>
+              <a:t>.</a:t>
+            </a:r>
+          </a:p>
+          <a:p>
+            <a:pPr lvl="1"/>
+            <a:r>
+              <a:rPr lang="en-IN" sz="2000" dirty="0"/>
+              <a:t>E</a:t>
+            </a:r>
+            <a:r>
+              <a:rPr lang="en-IN" sz="2000" dirty="0" smtClean="0"/>
+              <a:t>ven </a:t>
+            </a:r>
+            <a:r>
+              <a:rPr lang="en-IN" sz="2000" dirty="0"/>
+              <a:t>manually set all the values in the </a:t>
+            </a:r>
+            <a:r>
+              <a:rPr lang="en-IN" sz="2000" dirty="0" err="1"/>
+              <a:t>enum</a:t>
+            </a:r>
+            <a:r>
+              <a:rPr lang="en-IN" sz="2000" dirty="0"/>
+              <a:t>:</a:t>
+            </a:r>
+            <a:endParaRPr lang="en-IN" sz="1900" dirty="0" smtClean="0"/>
+          </a:p>
+        </p:txBody>
+      </p:sp>
+      <p:sp>
+        <p:nvSpPr>
+          <p:cNvPr id="4" name="Content Placeholder 3"/>
+          <p:cNvSpPr>
+            <a:spLocks noGrp="1"/>
+          </p:cNvSpPr>
+          <p:nvPr>
+            <p:ph sz="half" idx="2"/>
+          </p:nvPr>
+        </p:nvSpPr>
+        <p:spPr>
+          <a:xfrm>
+            <a:off x="6607968" y="1978925"/>
+            <a:ext cx="4895056" cy="3903260"/>
+          </a:xfrm>
+        </p:spPr>
+        <p:txBody>
+          <a:bodyPr>
+            <a:normAutofit/>
+          </a:bodyPr>
+          <a:lstStyle/>
+          <a:p>
+            <a:pPr>
+              <a:buFont typeface="Wingdings" panose="05000000000000000000" pitchFamily="2" charset="2"/>
+              <a:buChar char="Ø"/>
+            </a:pPr>
+            <a:r>
+              <a:rPr lang="en-US" b="1" dirty="0"/>
+              <a:t>Example:</a:t>
+            </a:r>
+          </a:p>
+          <a:p>
+            <a:r>
+              <a:rPr lang="en-IN" dirty="0" err="1"/>
+              <a:t>enum</a:t>
+            </a:r>
+            <a:r>
+              <a:rPr lang="en-IN" dirty="0"/>
+              <a:t> </a:t>
+            </a:r>
+            <a:r>
+              <a:rPr lang="en-IN" dirty="0" err="1"/>
+              <a:t>Color</a:t>
+            </a:r>
+            <a:r>
+              <a:rPr lang="en-IN" dirty="0"/>
+              <a:t> </a:t>
+            </a:r>
+            <a:r>
+              <a:rPr lang="en-IN" dirty="0" smtClean="0"/>
+              <a:t>{  </a:t>
+            </a:r>
+            <a:r>
+              <a:rPr lang="en-IN" dirty="0"/>
+              <a:t>Red</a:t>
+            </a:r>
+            <a:r>
+              <a:rPr lang="en-IN" dirty="0" smtClean="0"/>
+              <a:t>,  </a:t>
+            </a:r>
+            <a:r>
+              <a:rPr lang="en-IN" dirty="0"/>
+              <a:t>Green</a:t>
+            </a:r>
+            <a:r>
+              <a:rPr lang="en-IN" dirty="0" smtClean="0"/>
+              <a:t>,  </a:t>
+            </a:r>
+            <a:r>
+              <a:rPr lang="en-IN" dirty="0"/>
+              <a:t>Blue</a:t>
+            </a:r>
+            <a:r>
+              <a:rPr lang="en-IN" dirty="0" smtClean="0"/>
+              <a:t>,}</a:t>
+            </a:r>
+            <a:endParaRPr lang="en-IN" dirty="0"/>
+          </a:p>
+          <a:p>
+            <a:pPr marL="0" indent="0">
+              <a:buNone/>
+            </a:pPr>
+            <a:r>
+              <a:rPr lang="en-IN" dirty="0"/>
+              <a:t>let c: </a:t>
+            </a:r>
+            <a:r>
+              <a:rPr lang="en-IN" dirty="0" err="1" smtClean="0"/>
+              <a:t>Color</a:t>
+            </a:r>
+            <a:r>
+              <a:rPr lang="en-IN" dirty="0" smtClean="0"/>
+              <a:t> </a:t>
+            </a:r>
+            <a:r>
+              <a:rPr lang="en-IN" dirty="0"/>
+              <a:t>= </a:t>
+            </a:r>
+            <a:r>
+              <a:rPr lang="en-IN" dirty="0" err="1"/>
+              <a:t>Color.Green</a:t>
+            </a:r>
+            <a:r>
+              <a:rPr lang="en-IN" dirty="0" smtClean="0"/>
+              <a:t>;</a:t>
+            </a:r>
+          </a:p>
+          <a:p>
+            <a:r>
+              <a:rPr lang="en-IN" dirty="0" err="1"/>
+              <a:t>enum</a:t>
+            </a:r>
+            <a:r>
+              <a:rPr lang="en-IN" dirty="0"/>
+              <a:t> </a:t>
+            </a:r>
+            <a:r>
+              <a:rPr lang="en-IN" dirty="0" err="1"/>
+              <a:t>Color</a:t>
+            </a:r>
+            <a:r>
+              <a:rPr lang="en-IN" dirty="0"/>
+              <a:t> </a:t>
+            </a:r>
+            <a:r>
+              <a:rPr lang="en-IN" dirty="0" smtClean="0"/>
+              <a:t>{Red </a:t>
+            </a:r>
+            <a:r>
+              <a:rPr lang="en-IN" dirty="0"/>
+              <a:t>= </a:t>
+            </a:r>
+            <a:r>
+              <a:rPr lang="en-IN" dirty="0" smtClean="0"/>
+              <a:t>1,Green </a:t>
+            </a:r>
+            <a:r>
+              <a:rPr lang="en-IN" dirty="0"/>
+              <a:t>= </a:t>
+            </a:r>
+            <a:r>
+              <a:rPr lang="en-IN" dirty="0" smtClean="0"/>
+              <a:t>2,Blue </a:t>
+            </a:r>
+            <a:r>
+              <a:rPr lang="en-IN" dirty="0"/>
+              <a:t>= 4</a:t>
+            </a:r>
+            <a:r>
+              <a:rPr lang="en-IN" dirty="0" smtClean="0"/>
+              <a:t>,}</a:t>
+            </a:r>
+            <a:endParaRPr lang="en-IN" dirty="0"/>
+          </a:p>
+          <a:p>
+            <a:pPr marL="0" indent="0">
+              <a:buNone/>
+            </a:pPr>
+            <a:r>
+              <a:rPr lang="en-IN" dirty="0"/>
+              <a:t>let c: </a:t>
+            </a:r>
+            <a:r>
+              <a:rPr lang="en-IN" dirty="0" err="1"/>
+              <a:t>Color</a:t>
+            </a:r>
+            <a:r>
+              <a:rPr lang="en-IN" dirty="0"/>
+              <a:t> = </a:t>
+            </a:r>
+            <a:r>
+              <a:rPr lang="en-IN" dirty="0" err="1"/>
+              <a:t>Color.Green</a:t>
+            </a:r>
+            <a:r>
+              <a:rPr lang="en-IN" dirty="0"/>
+              <a:t>;</a:t>
+            </a:r>
+          </a:p>
+          <a:p>
+            <a:endParaRPr lang="en-IN" dirty="0" smtClean="0"/>
+          </a:p>
+          <a:p>
+            <a:pPr marL="0" indent="0">
+              <a:buNone/>
+            </a:pPr>
+            <a:endParaRPr lang="en-IN" dirty="0"/>
+          </a:p>
+        </p:txBody>
+      </p:sp>
+    </p:spTree>
+    <p:extLst>
+      <p:ext uri="{BB962C8B-B14F-4D97-AF65-F5344CB8AC3E}">
+        <p14:creationId xmlns:p14="http://schemas.microsoft.com/office/powerpoint/2010/main" val="3518910593"/>
+      </p:ext>
+    </p:extLst>
+  </p:cSld>
+  <p:clrMapOvr>
+    <a:masterClrMapping/>
+  </p:clrMapOvr>
+</p:sld>
+</file>
+
+<file path=ppt/slides/slide17.xml><?xml version="1.0" encoding="utf-8"?>
+<p:sld xmlns:a="http://schemas.openxmlformats.org/drawingml/2006/main" xmlns:r="http://schemas.openxmlformats.org/officeDocument/2006/relationships" xmlns:p="http://schemas.openxmlformats.org/presentationml/2006/main">
+  <p:cSld>
+    <p:spTree>
+      <p:nvGrpSpPr>
+        <p:cNvPr id="1" name=""/>
+        <p:cNvGrpSpPr/>
+        <p:nvPr/>
+      </p:nvGrpSpPr>
+      <p:grpSpPr>
+        <a:xfrm>
+          <a:off x="0" y="0"/>
+          <a:ext cx="0" cy="0"/>
+          <a:chOff x="0" y="0"/>
+          <a:chExt cx="0" cy="0"/>
+        </a:xfrm>
+      </p:grpSpPr>
+      <p:sp>
+        <p:nvSpPr>
+          <p:cNvPr id="2" name="Title 1"/>
+          <p:cNvSpPr>
+            <a:spLocks noGrp="1"/>
+          </p:cNvSpPr>
+          <p:nvPr>
+            <p:ph type="title"/>
+          </p:nvPr>
+        </p:nvSpPr>
+        <p:spPr>
+          <a:xfrm>
+            <a:off x="1484311" y="685800"/>
+            <a:ext cx="10018713" cy="1293125"/>
+          </a:xfrm>
+        </p:spPr>
+        <p:txBody>
+          <a:bodyPr/>
+          <a:lstStyle/>
+          <a:p>
+            <a:r>
+              <a:rPr lang="en-IN" dirty="0" smtClean="0"/>
+              <a:t>Data Types in TypeScript</a:t>
+            </a:r>
+            <a:endParaRPr lang="en-IN" dirty="0"/>
+          </a:p>
+        </p:txBody>
+      </p:sp>
+      <p:sp>
+        <p:nvSpPr>
+          <p:cNvPr id="3" name="Content Placeholder 2"/>
+          <p:cNvSpPr>
+            <a:spLocks noGrp="1"/>
+          </p:cNvSpPr>
+          <p:nvPr>
+            <p:ph sz="half" idx="1"/>
+          </p:nvPr>
+        </p:nvSpPr>
+        <p:spPr>
+          <a:xfrm>
+            <a:off x="1484312" y="1978925"/>
+            <a:ext cx="4861897" cy="3903260"/>
+          </a:xfrm>
+        </p:spPr>
+        <p:txBody>
+          <a:bodyPr>
+            <a:normAutofit fontScale="92500" lnSpcReduction="10000"/>
+          </a:bodyPr>
+          <a:lstStyle/>
+          <a:p>
+            <a:pPr>
+              <a:lnSpc>
+                <a:spcPct val="110000"/>
+              </a:lnSpc>
+              <a:buFont typeface="Wingdings" panose="05000000000000000000" pitchFamily="2" charset="2"/>
+              <a:buChar char="Ø"/>
+            </a:pPr>
+            <a:r>
+              <a:rPr lang="en-US" sz="2800" dirty="0" smtClean="0"/>
+              <a:t>Unknown:</a:t>
+            </a:r>
+            <a:endParaRPr lang="en-US" sz="2800" dirty="0"/>
+          </a:p>
+          <a:p>
+            <a:pPr lvl="1"/>
+            <a:r>
+              <a:rPr lang="en-IN" sz="1900" dirty="0" smtClean="0"/>
+              <a:t>To </a:t>
+            </a:r>
+            <a:r>
+              <a:rPr lang="en-IN" sz="1900" dirty="0"/>
+              <a:t>describe the type of variables that we do not know when we are writing an application. These values may come from dynamic content.</a:t>
+            </a:r>
+            <a:endParaRPr lang="en-IN" sz="1900" dirty="0" smtClean="0"/>
+          </a:p>
+          <a:p>
+            <a:pPr lvl="1"/>
+            <a:r>
+              <a:rPr lang="en-IN" sz="2000" dirty="0"/>
+              <a:t>e.g. from the user – or we may want to intentionally accept all values in our API. </a:t>
+            </a:r>
+            <a:endParaRPr lang="en-IN" sz="2000" dirty="0" smtClean="0"/>
+          </a:p>
+          <a:p>
+            <a:pPr lvl="1"/>
+            <a:r>
+              <a:rPr lang="en-IN" sz="1900" dirty="0"/>
+              <a:t>In these cases, we want to provide a type that tells the compiler and future readers that this variable could be anything, so we give it the unknown type.</a:t>
+            </a:r>
+            <a:endParaRPr lang="en-IN" sz="1900" dirty="0" smtClean="0"/>
+          </a:p>
+        </p:txBody>
+      </p:sp>
+      <p:sp>
+        <p:nvSpPr>
+          <p:cNvPr id="4" name="Content Placeholder 3"/>
+          <p:cNvSpPr>
+            <a:spLocks noGrp="1"/>
+          </p:cNvSpPr>
+          <p:nvPr>
+            <p:ph sz="half" idx="2"/>
+          </p:nvPr>
+        </p:nvSpPr>
+        <p:spPr>
+          <a:xfrm>
+            <a:off x="6607968" y="1978925"/>
+            <a:ext cx="4895056" cy="3903260"/>
+          </a:xfrm>
+        </p:spPr>
+        <p:txBody>
+          <a:bodyPr>
+            <a:normAutofit fontScale="92500" lnSpcReduction="10000"/>
+          </a:bodyPr>
+          <a:lstStyle/>
+          <a:p>
+            <a:pPr>
+              <a:buFont typeface="Wingdings" panose="05000000000000000000" pitchFamily="2" charset="2"/>
+              <a:buChar char="Ø"/>
+            </a:pPr>
+            <a:r>
+              <a:rPr lang="en-US" b="1" dirty="0"/>
+              <a:t>Example:</a:t>
+            </a:r>
+          </a:p>
+          <a:p>
+            <a:r>
+              <a:rPr lang="en-IN" dirty="0"/>
+              <a:t>let </a:t>
+            </a:r>
+            <a:r>
+              <a:rPr lang="en-IN" dirty="0" err="1"/>
+              <a:t>notSure</a:t>
+            </a:r>
+            <a:r>
+              <a:rPr lang="en-IN" dirty="0"/>
+              <a:t>: unknown = 4;</a:t>
+            </a:r>
+          </a:p>
+          <a:p>
+            <a:r>
+              <a:rPr lang="en-IN" dirty="0" err="1"/>
+              <a:t>notSure</a:t>
+            </a:r>
+            <a:r>
+              <a:rPr lang="en-IN" dirty="0"/>
+              <a:t> = "maybe a string instead</a:t>
+            </a:r>
+            <a:r>
+              <a:rPr lang="en-IN" dirty="0" smtClean="0"/>
+              <a:t>";</a:t>
+            </a:r>
+            <a:endParaRPr lang="en-IN" dirty="0"/>
+          </a:p>
+          <a:p>
+            <a:pPr marL="0" indent="0">
+              <a:buNone/>
+            </a:pPr>
+            <a:r>
+              <a:rPr lang="en-IN" dirty="0" smtClean="0"/>
+              <a:t>// </a:t>
+            </a:r>
+            <a:r>
+              <a:rPr lang="en-IN" dirty="0"/>
+              <a:t>OK, definitely a </a:t>
+            </a:r>
+            <a:r>
+              <a:rPr lang="en-IN" dirty="0" err="1"/>
+              <a:t>boolean</a:t>
+            </a:r>
+            <a:endParaRPr lang="en-IN" dirty="0"/>
+          </a:p>
+          <a:p>
+            <a:r>
+              <a:rPr lang="en-IN" dirty="0" err="1"/>
+              <a:t>notSure</a:t>
+            </a:r>
+            <a:r>
+              <a:rPr lang="en-IN" dirty="0"/>
+              <a:t> = false;</a:t>
+            </a:r>
+          </a:p>
+          <a:p>
+            <a:endParaRPr lang="en-IN" dirty="0" smtClean="0"/>
+          </a:p>
+          <a:p>
+            <a:pPr marL="0" indent="0">
+              <a:buNone/>
+            </a:pPr>
+            <a:endParaRPr lang="en-IN" dirty="0"/>
+          </a:p>
+        </p:txBody>
+      </p:sp>
+    </p:spTree>
+    <p:extLst>
+      <p:ext uri="{BB962C8B-B14F-4D97-AF65-F5344CB8AC3E}">
+        <p14:creationId xmlns:p14="http://schemas.microsoft.com/office/powerpoint/2010/main" val="3836736420"/>
+      </p:ext>
+    </p:extLst>
+  </p:cSld>
+  <p:clrMapOvr>
+    <a:masterClrMapping/>
+  </p:clrMapOvr>
+</p:sld>
+</file>
+
+<file path=ppt/slides/slide18.xml><?xml version="1.0" encoding="utf-8"?>
+<p:sld xmlns:a="http://schemas.openxmlformats.org/drawingml/2006/main" xmlns:r="http://schemas.openxmlformats.org/officeDocument/2006/relationships" xmlns:p="http://schemas.openxmlformats.org/presentationml/2006/main">
+  <p:cSld>
+    <p:spTree>
+      <p:nvGrpSpPr>
+        <p:cNvPr id="1" name=""/>
+        <p:cNvGrpSpPr/>
+        <p:nvPr/>
+      </p:nvGrpSpPr>
+      <p:grpSpPr>
+        <a:xfrm>
+          <a:off x="0" y="0"/>
+          <a:ext cx="0" cy="0"/>
+          <a:chOff x="0" y="0"/>
+          <a:chExt cx="0" cy="0"/>
+        </a:xfrm>
+      </p:grpSpPr>
+      <p:sp>
+        <p:nvSpPr>
+          <p:cNvPr id="2" name="Title 1"/>
+          <p:cNvSpPr>
+            <a:spLocks noGrp="1"/>
+          </p:cNvSpPr>
+          <p:nvPr>
+            <p:ph type="title"/>
+          </p:nvPr>
+        </p:nvSpPr>
+        <p:spPr>
+          <a:xfrm>
+            <a:off x="1484311" y="685800"/>
+            <a:ext cx="10018713" cy="1293125"/>
+          </a:xfrm>
+        </p:spPr>
+        <p:txBody>
+          <a:bodyPr/>
+          <a:lstStyle/>
+          <a:p>
+            <a:r>
+              <a:rPr lang="en-IN" dirty="0" smtClean="0"/>
+              <a:t>Data Types in TypeScript</a:t>
+            </a:r>
+            <a:endParaRPr lang="en-IN" dirty="0"/>
+          </a:p>
+        </p:txBody>
+      </p:sp>
+      <p:sp>
+        <p:nvSpPr>
+          <p:cNvPr id="3" name="Content Placeholder 2"/>
+          <p:cNvSpPr>
+            <a:spLocks noGrp="1"/>
+          </p:cNvSpPr>
+          <p:nvPr>
+            <p:ph sz="half" idx="1"/>
+          </p:nvPr>
+        </p:nvSpPr>
+        <p:spPr>
+          <a:xfrm>
+            <a:off x="1484312" y="1774210"/>
+            <a:ext cx="4861897" cy="4844954"/>
+          </a:xfrm>
+        </p:spPr>
+        <p:txBody>
+          <a:bodyPr>
+            <a:normAutofit fontScale="85000" lnSpcReduction="10000"/>
+          </a:bodyPr>
+          <a:lstStyle/>
+          <a:p>
+            <a:pPr>
+              <a:lnSpc>
+                <a:spcPct val="110000"/>
+              </a:lnSpc>
+              <a:buFont typeface="Wingdings" panose="05000000000000000000" pitchFamily="2" charset="2"/>
+              <a:buChar char="Ø"/>
+            </a:pPr>
+            <a:r>
+              <a:rPr lang="en-US" sz="2800" dirty="0" smtClean="0"/>
+              <a:t>Any:</a:t>
+            </a:r>
+            <a:endParaRPr lang="en-US" sz="2800" dirty="0"/>
+          </a:p>
+          <a:p>
+            <a:pPr lvl="1"/>
+            <a:r>
+              <a:rPr lang="en-IN" sz="1900" dirty="0"/>
+              <a:t>In some situations, not all type information is available or its declaration would take an inappropriate amount of effort. These may occur for values from code that has been written without TypeScript or a 3rd party library. In these cases, we might want to opt-out of type checking. To do so, we label these values with the any </a:t>
+            </a:r>
+            <a:r>
+              <a:rPr lang="en-IN" sz="1900" dirty="0" smtClean="0"/>
+              <a:t>type.</a:t>
+            </a:r>
+          </a:p>
+          <a:p>
+            <a:pPr lvl="1"/>
+            <a:r>
+              <a:rPr lang="en-IN" sz="1900" dirty="0"/>
+              <a:t>The any type is a powerful way to work with existing JavaScript, allowing you to gradually opt-in and opt-out of type checking during compilation</a:t>
+            </a:r>
+            <a:r>
+              <a:rPr lang="en-IN" sz="1900" dirty="0" smtClean="0"/>
+              <a:t>.</a:t>
+            </a:r>
+            <a:endParaRPr lang="en-IN" sz="1900" dirty="0"/>
+          </a:p>
+          <a:p>
+            <a:pPr lvl="1"/>
+            <a:r>
+              <a:rPr lang="en-IN" sz="1900" dirty="0"/>
+              <a:t>Unlike unknown, variables of type any allow you to access arbitrary properties, even ones that don’t exist. These properties include functions and TypeScript will not check their existence or type:</a:t>
+            </a:r>
+            <a:endParaRPr lang="en-IN" sz="1900" dirty="0" smtClean="0"/>
+          </a:p>
+        </p:txBody>
+      </p:sp>
+      <p:sp>
+        <p:nvSpPr>
+          <p:cNvPr id="4" name="Content Placeholder 3"/>
+          <p:cNvSpPr>
+            <a:spLocks noGrp="1"/>
+          </p:cNvSpPr>
+          <p:nvPr>
+            <p:ph sz="half" idx="2"/>
+          </p:nvPr>
+        </p:nvSpPr>
+        <p:spPr>
+          <a:xfrm>
+            <a:off x="6607968" y="1978925"/>
+            <a:ext cx="4895056" cy="3903260"/>
+          </a:xfrm>
+        </p:spPr>
+        <p:txBody>
+          <a:bodyPr>
+            <a:normAutofit fontScale="85000" lnSpcReduction="10000"/>
+          </a:bodyPr>
+          <a:lstStyle/>
+          <a:p>
+            <a:pPr>
+              <a:buFont typeface="Wingdings" panose="05000000000000000000" pitchFamily="2" charset="2"/>
+              <a:buChar char="Ø"/>
+            </a:pPr>
+            <a:r>
+              <a:rPr lang="en-US" b="1" dirty="0"/>
+              <a:t>Example:</a:t>
+            </a:r>
+          </a:p>
+          <a:p>
+            <a:r>
+              <a:rPr lang="en-IN" dirty="0"/>
+              <a:t>declare function </a:t>
+            </a:r>
+            <a:r>
+              <a:rPr lang="en-IN" dirty="0" err="1"/>
+              <a:t>getValue</a:t>
+            </a:r>
+            <a:r>
+              <a:rPr lang="en-IN" dirty="0"/>
+              <a:t>(key: string): any;</a:t>
+            </a:r>
+          </a:p>
+          <a:p>
+            <a:pPr marL="0" indent="0">
+              <a:buNone/>
+            </a:pPr>
+            <a:r>
+              <a:rPr lang="en-IN" dirty="0"/>
+              <a:t>// OK, return value of '</a:t>
+            </a:r>
+            <a:r>
+              <a:rPr lang="en-IN" dirty="0" err="1"/>
+              <a:t>getValue</a:t>
+            </a:r>
+            <a:r>
+              <a:rPr lang="en-IN" dirty="0"/>
+              <a:t>' is not checked</a:t>
+            </a:r>
+          </a:p>
+          <a:p>
+            <a:r>
+              <a:rPr lang="en-IN" dirty="0" err="1"/>
+              <a:t>const</a:t>
+            </a:r>
+            <a:r>
+              <a:rPr lang="en-IN" dirty="0"/>
+              <a:t> </a:t>
+            </a:r>
+            <a:r>
+              <a:rPr lang="en-IN" dirty="0" err="1"/>
+              <a:t>str</a:t>
+            </a:r>
+            <a:r>
+              <a:rPr lang="en-IN" dirty="0"/>
+              <a:t>: string = </a:t>
+            </a:r>
+            <a:r>
+              <a:rPr lang="en-IN" dirty="0" err="1"/>
+              <a:t>getValue</a:t>
+            </a:r>
+            <a:r>
+              <a:rPr lang="en-IN" dirty="0"/>
+              <a:t>("</a:t>
+            </a:r>
+            <a:r>
+              <a:rPr lang="en-IN" dirty="0" err="1"/>
+              <a:t>myString</a:t>
+            </a:r>
+            <a:r>
+              <a:rPr lang="en-IN" dirty="0" smtClean="0"/>
+              <a:t>");</a:t>
+            </a:r>
+          </a:p>
+          <a:p>
+            <a:r>
+              <a:rPr lang="en-IN" dirty="0"/>
+              <a:t>let </a:t>
+            </a:r>
+            <a:r>
+              <a:rPr lang="en-IN" dirty="0" err="1"/>
+              <a:t>looselyTyped</a:t>
+            </a:r>
+            <a:r>
+              <a:rPr lang="en-IN" dirty="0"/>
+              <a:t>: any = 4;</a:t>
+            </a:r>
+          </a:p>
+          <a:p>
+            <a:pPr marL="0" indent="0">
+              <a:buNone/>
+            </a:pPr>
+            <a:r>
+              <a:rPr lang="en-IN" dirty="0"/>
+              <a:t>// OK, </a:t>
+            </a:r>
+            <a:r>
+              <a:rPr lang="en-IN" dirty="0" err="1"/>
+              <a:t>ifItExists</a:t>
+            </a:r>
+            <a:r>
+              <a:rPr lang="en-IN" dirty="0"/>
+              <a:t> might exist at runtime</a:t>
+            </a:r>
+          </a:p>
+          <a:p>
+            <a:r>
+              <a:rPr lang="en-IN" dirty="0" err="1"/>
+              <a:t>looselyTyped.ifItExists</a:t>
+            </a:r>
+            <a:r>
+              <a:rPr lang="en-IN" dirty="0"/>
+              <a:t>();</a:t>
+            </a:r>
+          </a:p>
+          <a:p>
+            <a:pPr marL="0" indent="0">
+              <a:buNone/>
+            </a:pPr>
+            <a:r>
+              <a:rPr lang="en-IN" dirty="0"/>
+              <a:t>// OK, </a:t>
+            </a:r>
+            <a:r>
+              <a:rPr lang="en-IN" dirty="0" err="1"/>
+              <a:t>toFixed</a:t>
+            </a:r>
+            <a:r>
+              <a:rPr lang="en-IN" dirty="0"/>
+              <a:t> exists (but the compiler doesn't check)</a:t>
+            </a:r>
+          </a:p>
+          <a:p>
+            <a:r>
+              <a:rPr lang="en-IN" dirty="0" err="1"/>
+              <a:t>looselyTyped.toFixed</a:t>
+            </a:r>
+            <a:r>
+              <a:rPr lang="en-IN" dirty="0" smtClean="0"/>
+              <a:t>();</a:t>
+            </a:r>
+          </a:p>
+        </p:txBody>
+      </p:sp>
+    </p:spTree>
+    <p:extLst>
+      <p:ext uri="{BB962C8B-B14F-4D97-AF65-F5344CB8AC3E}">
+        <p14:creationId xmlns:p14="http://schemas.microsoft.com/office/powerpoint/2010/main" val="971785208"/>
+      </p:ext>
+    </p:extLst>
+  </p:cSld>
+  <p:clrMapOvr>
+    <a:masterClrMapping/>
+  </p:clrMapOvr>
+</p:sld>
+</file>
+
+<file path=ppt/slides/slide19.xml><?xml version="1.0" encoding="utf-8"?>
+<p:sld xmlns:a="http://schemas.openxmlformats.org/drawingml/2006/main" xmlns:r="http://schemas.openxmlformats.org/officeDocument/2006/relationships" xmlns:p="http://schemas.openxmlformats.org/presentationml/2006/main">
+  <p:cSld>
+    <p:spTree>
+      <p:nvGrpSpPr>
+        <p:cNvPr id="1" name=""/>
+        <p:cNvGrpSpPr/>
+        <p:nvPr/>
+      </p:nvGrpSpPr>
+      <p:grpSpPr>
+        <a:xfrm>
+          <a:off x="0" y="0"/>
+          <a:ext cx="0" cy="0"/>
+          <a:chOff x="0" y="0"/>
+          <a:chExt cx="0" cy="0"/>
+        </a:xfrm>
+      </p:grpSpPr>
+      <p:sp>
+        <p:nvSpPr>
+          <p:cNvPr id="2" name="Title 1"/>
+          <p:cNvSpPr>
+            <a:spLocks noGrp="1"/>
+          </p:cNvSpPr>
+          <p:nvPr>
+            <p:ph type="title"/>
+          </p:nvPr>
+        </p:nvSpPr>
+        <p:spPr>
+          <a:xfrm>
+            <a:off x="1484311" y="685800"/>
+            <a:ext cx="10018713" cy="1293125"/>
+          </a:xfrm>
+        </p:spPr>
+        <p:txBody>
+          <a:bodyPr/>
+          <a:lstStyle/>
+          <a:p>
+            <a:r>
+              <a:rPr lang="en-IN" dirty="0" smtClean="0"/>
+              <a:t>Data Types in TypeScript</a:t>
+            </a:r>
+            <a:endParaRPr lang="en-IN" dirty="0"/>
+          </a:p>
+        </p:txBody>
+      </p:sp>
+      <p:sp>
+        <p:nvSpPr>
+          <p:cNvPr id="3" name="Content Placeholder 2"/>
+          <p:cNvSpPr>
+            <a:spLocks noGrp="1"/>
+          </p:cNvSpPr>
+          <p:nvPr>
+            <p:ph sz="half" idx="1"/>
+          </p:nvPr>
+        </p:nvSpPr>
+        <p:spPr>
+          <a:xfrm>
+            <a:off x="1484312" y="1774210"/>
+            <a:ext cx="4861897" cy="4844954"/>
+          </a:xfrm>
+        </p:spPr>
+        <p:txBody>
+          <a:bodyPr>
+            <a:normAutofit/>
+          </a:bodyPr>
+          <a:lstStyle/>
+          <a:p>
+            <a:pPr>
+              <a:lnSpc>
+                <a:spcPct val="110000"/>
+              </a:lnSpc>
+              <a:buFont typeface="Wingdings" panose="05000000000000000000" pitchFamily="2" charset="2"/>
+              <a:buChar char="Ø"/>
+            </a:pPr>
+            <a:r>
+              <a:rPr lang="en-US" sz="2800" dirty="0" smtClean="0"/>
+              <a:t>Void:</a:t>
+            </a:r>
+            <a:endParaRPr lang="en-US" sz="2800" dirty="0"/>
+          </a:p>
+          <a:p>
+            <a:pPr lvl="1"/>
+            <a:r>
+              <a:rPr lang="en-IN" sz="1900" dirty="0"/>
+              <a:t>void is a little like the opposite of any: the absence of having any type at all. You may commonly see this as the return type of functions that do not return a </a:t>
+            </a:r>
+            <a:r>
+              <a:rPr lang="en-IN" sz="1900" dirty="0" smtClean="0"/>
+              <a:t>value.</a:t>
+            </a:r>
+          </a:p>
+          <a:p>
+            <a:pPr lvl="1"/>
+            <a:r>
+              <a:rPr lang="en-IN" sz="1900" dirty="0"/>
+              <a:t>Declaring variables of type void is not useful because you can only assign null (only if --</a:t>
+            </a:r>
+            <a:r>
+              <a:rPr lang="en-IN" sz="1900" dirty="0" err="1"/>
+              <a:t>strictNullChecks</a:t>
+            </a:r>
+            <a:r>
+              <a:rPr lang="en-IN" sz="1900" dirty="0"/>
+              <a:t> is not specified, see next section) or undefined to them:</a:t>
+            </a:r>
+            <a:endParaRPr lang="en-IN" sz="1900" dirty="0" smtClean="0"/>
+          </a:p>
+          <a:p>
+            <a:pPr lvl="1"/>
+            <a:endParaRPr lang="en-IN" sz="1900" dirty="0" smtClean="0"/>
+          </a:p>
+        </p:txBody>
+      </p:sp>
+      <p:sp>
+        <p:nvSpPr>
+          <p:cNvPr id="4" name="Content Placeholder 3"/>
+          <p:cNvSpPr>
+            <a:spLocks noGrp="1"/>
+          </p:cNvSpPr>
+          <p:nvPr>
+            <p:ph sz="half" idx="2"/>
+          </p:nvPr>
+        </p:nvSpPr>
+        <p:spPr>
+          <a:xfrm>
+            <a:off x="6607968" y="1978925"/>
+            <a:ext cx="4895056" cy="3903260"/>
+          </a:xfrm>
+        </p:spPr>
+        <p:txBody>
+          <a:bodyPr>
+            <a:normAutofit/>
+          </a:bodyPr>
+          <a:lstStyle/>
+          <a:p>
+            <a:pPr>
+              <a:buFont typeface="Wingdings" panose="05000000000000000000" pitchFamily="2" charset="2"/>
+              <a:buChar char="Ø"/>
+            </a:pPr>
+            <a:r>
+              <a:rPr lang="en-US" b="1" dirty="0"/>
+              <a:t>Example:</a:t>
+            </a:r>
+          </a:p>
+          <a:p>
+            <a:r>
+              <a:rPr lang="en-IN" dirty="0"/>
+              <a:t>function </a:t>
+            </a:r>
+            <a:r>
+              <a:rPr lang="en-IN" dirty="0" err="1"/>
+              <a:t>warnUser</a:t>
+            </a:r>
+            <a:r>
+              <a:rPr lang="en-IN" dirty="0"/>
+              <a:t>(): void </a:t>
+            </a:r>
+            <a:r>
+              <a:rPr lang="en-IN" dirty="0" smtClean="0"/>
+              <a:t>{</a:t>
+            </a:r>
+          </a:p>
+          <a:p>
+            <a:pPr marL="0" indent="0">
+              <a:buNone/>
+            </a:pPr>
+            <a:r>
+              <a:rPr lang="en-IN" dirty="0" smtClean="0"/>
+              <a:t>  </a:t>
+            </a:r>
+            <a:r>
+              <a:rPr lang="en-IN" dirty="0"/>
+              <a:t>console.log("This is my warning message");</a:t>
+            </a:r>
+          </a:p>
+          <a:p>
+            <a:pPr marL="0" indent="0">
+              <a:buNone/>
+            </a:pPr>
+            <a:r>
+              <a:rPr lang="en-IN" dirty="0" smtClean="0"/>
+              <a:t>}</a:t>
+            </a:r>
+          </a:p>
+          <a:p>
+            <a:r>
+              <a:rPr lang="en-IN" dirty="0"/>
+              <a:t>let unusable: void = undefined;</a:t>
+            </a:r>
+          </a:p>
+          <a:p>
+            <a:pPr marL="0" indent="0">
+              <a:buNone/>
+            </a:pPr>
+            <a:r>
+              <a:rPr lang="en-IN" dirty="0"/>
+              <a:t>// OK if `--</a:t>
+            </a:r>
+            <a:r>
+              <a:rPr lang="en-IN" dirty="0" err="1"/>
+              <a:t>strictNullChecks</a:t>
+            </a:r>
+            <a:r>
+              <a:rPr lang="en-IN" dirty="0"/>
+              <a:t>` is not given</a:t>
+            </a:r>
+          </a:p>
+          <a:p>
+            <a:r>
+              <a:rPr lang="en-IN" dirty="0"/>
+              <a:t>unusable = null;</a:t>
+            </a:r>
+          </a:p>
+        </p:txBody>
+      </p:sp>
+    </p:spTree>
+    <p:extLst>
+      <p:ext uri="{BB962C8B-B14F-4D97-AF65-F5344CB8AC3E}">
+        <p14:creationId xmlns:p14="http://schemas.microsoft.com/office/powerpoint/2010/main" val="4110350557"/>
+      </p:ext>
+    </p:extLst>
+  </p:cSld>
+  <p:clrMapOvr>
+    <a:masterClrMapping/>
+  </p:clrMapOvr>
+</p:sld>
+</file>
+
 <file path=ppt/slides/slide2.xml><?xml version="1.0" encoding="utf-8"?>
 <p:sld xmlns:a="http://schemas.openxmlformats.org/drawingml/2006/main" xmlns:r="http://schemas.openxmlformats.org/officeDocument/2006/relationships" xmlns:p="http://schemas.openxmlformats.org/presentationml/2006/main">
   <p:cSld>
@@ -7472,6 +9594,1828 @@
 </p:sld>
 </file>
 
+<file path=ppt/slides/slide20.xml><?xml version="1.0" encoding="utf-8"?>
+<p:sld xmlns:a="http://schemas.openxmlformats.org/drawingml/2006/main" xmlns:r="http://schemas.openxmlformats.org/officeDocument/2006/relationships" xmlns:p="http://schemas.openxmlformats.org/presentationml/2006/main">
+  <p:cSld>
+    <p:spTree>
+      <p:nvGrpSpPr>
+        <p:cNvPr id="1" name=""/>
+        <p:cNvGrpSpPr/>
+        <p:nvPr/>
+      </p:nvGrpSpPr>
+      <p:grpSpPr>
+        <a:xfrm>
+          <a:off x="0" y="0"/>
+          <a:ext cx="0" cy="0"/>
+          <a:chOff x="0" y="0"/>
+          <a:chExt cx="0" cy="0"/>
+        </a:xfrm>
+      </p:grpSpPr>
+      <p:sp>
+        <p:nvSpPr>
+          <p:cNvPr id="2" name="Title 1"/>
+          <p:cNvSpPr>
+            <a:spLocks noGrp="1"/>
+          </p:cNvSpPr>
+          <p:nvPr>
+            <p:ph type="title"/>
+          </p:nvPr>
+        </p:nvSpPr>
+        <p:spPr/>
+        <p:txBody>
+          <a:bodyPr/>
+          <a:lstStyle/>
+          <a:p>
+            <a:r>
+              <a:rPr lang="en-IN" dirty="0"/>
+              <a:t>Data Types in TypeScript</a:t>
+            </a:r>
+          </a:p>
+        </p:txBody>
+      </p:sp>
+      <p:sp>
+        <p:nvSpPr>
+          <p:cNvPr id="3" name="Content Placeholder 2"/>
+          <p:cNvSpPr>
+            <a:spLocks noGrp="1"/>
+          </p:cNvSpPr>
+          <p:nvPr>
+            <p:ph sz="half" idx="1"/>
+          </p:nvPr>
+        </p:nvSpPr>
+        <p:spPr/>
+        <p:txBody>
+          <a:bodyPr/>
+          <a:lstStyle/>
+          <a:p>
+            <a:r>
+              <a:rPr lang="en-IN" sz="2800" dirty="0"/>
+              <a:t>Null and Undefined</a:t>
+            </a:r>
+          </a:p>
+          <a:p>
+            <a:r>
+              <a:rPr lang="en-IN" sz="2800" dirty="0"/>
+              <a:t>Never</a:t>
+            </a:r>
+          </a:p>
+          <a:p>
+            <a:r>
+              <a:rPr lang="en-IN" sz="2800" dirty="0"/>
+              <a:t>Object</a:t>
+            </a:r>
+          </a:p>
+          <a:p>
+            <a:endParaRPr lang="en-IN" dirty="0"/>
+          </a:p>
+        </p:txBody>
+      </p:sp>
+      <p:sp>
+        <p:nvSpPr>
+          <p:cNvPr id="4" name="Content Placeholder 3"/>
+          <p:cNvSpPr>
+            <a:spLocks noGrp="1"/>
+          </p:cNvSpPr>
+          <p:nvPr>
+            <p:ph sz="half" idx="2"/>
+          </p:nvPr>
+        </p:nvSpPr>
+        <p:spPr/>
+        <p:txBody>
+          <a:bodyPr/>
+          <a:lstStyle/>
+          <a:p>
+            <a:r>
+              <a:rPr lang="en-IN" dirty="0"/>
+              <a:t>let u: undefined = undefined;</a:t>
+            </a:r>
+          </a:p>
+          <a:p>
+            <a:r>
+              <a:rPr lang="en-IN" dirty="0"/>
+              <a:t>let n: null = null;</a:t>
+            </a:r>
+          </a:p>
+          <a:p>
+            <a:r>
+              <a:rPr lang="en-IN" dirty="0"/>
+              <a:t>function error(message: string): never {</a:t>
+            </a:r>
+          </a:p>
+          <a:p>
+            <a:pPr marL="0" indent="0">
+              <a:buNone/>
+            </a:pPr>
+            <a:r>
+              <a:rPr lang="en-IN" dirty="0"/>
+              <a:t>throw new Error(message);</a:t>
+            </a:r>
+          </a:p>
+          <a:p>
+            <a:pPr marL="0" indent="0">
+              <a:buNone/>
+            </a:pPr>
+            <a:r>
+              <a:rPr lang="en-IN" dirty="0" smtClean="0"/>
+              <a:t>}</a:t>
+            </a:r>
+          </a:p>
+          <a:p>
+            <a:r>
+              <a:rPr lang="en-IN" dirty="0"/>
+              <a:t>declare function create(o: object | null): void;</a:t>
+            </a:r>
+          </a:p>
+          <a:p>
+            <a:endParaRPr lang="en-IN" dirty="0"/>
+          </a:p>
+        </p:txBody>
+      </p:sp>
+    </p:spTree>
+    <p:extLst>
+      <p:ext uri="{BB962C8B-B14F-4D97-AF65-F5344CB8AC3E}">
+        <p14:creationId xmlns:p14="http://schemas.microsoft.com/office/powerpoint/2010/main" val="1980287061"/>
+      </p:ext>
+    </p:extLst>
+  </p:cSld>
+  <p:clrMapOvr>
+    <a:masterClrMapping/>
+  </p:clrMapOvr>
+</p:sld>
+</file>
+
+<file path=ppt/slides/slide21.xml><?xml version="1.0" encoding="utf-8"?>
+<p:sld xmlns:a="http://schemas.openxmlformats.org/drawingml/2006/main" xmlns:r="http://schemas.openxmlformats.org/officeDocument/2006/relationships" xmlns:p="http://schemas.openxmlformats.org/presentationml/2006/main">
+  <p:cSld>
+    <p:spTree>
+      <p:nvGrpSpPr>
+        <p:cNvPr id="1" name=""/>
+        <p:cNvGrpSpPr/>
+        <p:nvPr/>
+      </p:nvGrpSpPr>
+      <p:grpSpPr>
+        <a:xfrm>
+          <a:off x="0" y="0"/>
+          <a:ext cx="0" cy="0"/>
+          <a:chOff x="0" y="0"/>
+          <a:chExt cx="0" cy="0"/>
+        </a:xfrm>
+      </p:grpSpPr>
+      <p:sp>
+        <p:nvSpPr>
+          <p:cNvPr id="4" name="Title 3"/>
+          <p:cNvSpPr>
+            <a:spLocks noGrp="1"/>
+          </p:cNvSpPr>
+          <p:nvPr>
+            <p:ph type="title"/>
+          </p:nvPr>
+        </p:nvSpPr>
+        <p:spPr>
+          <a:xfrm>
+            <a:off x="1347833" y="290015"/>
+            <a:ext cx="10018713" cy="1074761"/>
+          </a:xfrm>
+        </p:spPr>
+        <p:txBody>
+          <a:bodyPr/>
+          <a:lstStyle/>
+          <a:p>
+            <a:r>
+              <a:rPr lang="en-IN" dirty="0" smtClean="0"/>
+              <a:t>Assignment Statements</a:t>
+            </a:r>
+            <a:r>
+              <a:rPr lang="en-IN" dirty="0"/>
+              <a:t> </a:t>
+            </a:r>
+            <a:r>
+              <a:rPr lang="en-IN" dirty="0" smtClean="0"/>
+              <a:t> </a:t>
+            </a:r>
+            <a:r>
+              <a:rPr lang="en-IN" dirty="0"/>
+              <a:t>in TypeScript</a:t>
+            </a:r>
+          </a:p>
+        </p:txBody>
+      </p:sp>
+      <p:sp>
+        <p:nvSpPr>
+          <p:cNvPr id="5" name="Content Placeholder 4"/>
+          <p:cNvSpPr>
+            <a:spLocks noGrp="1"/>
+          </p:cNvSpPr>
+          <p:nvPr>
+            <p:ph idx="1"/>
+          </p:nvPr>
+        </p:nvSpPr>
+        <p:spPr>
+          <a:xfrm>
+            <a:off x="1347833" y="1561530"/>
+            <a:ext cx="10018713" cy="4962100"/>
+          </a:xfrm>
+        </p:spPr>
+        <p:txBody>
+          <a:bodyPr/>
+          <a:lstStyle/>
+          <a:p>
+            <a:r>
+              <a:rPr lang="en-IN" dirty="0"/>
+              <a:t>Assignment operators are used to assign values to variables. </a:t>
+            </a:r>
+          </a:p>
+          <a:p>
+            <a:r>
+              <a:rPr lang="en-IN" dirty="0"/>
+              <a:t>This type of statement consists of a variable name, an assignment operator, and an expression.</a:t>
+            </a:r>
+          </a:p>
+          <a:p>
+            <a:r>
+              <a:rPr lang="en-IN" dirty="0"/>
+              <a:t>When appropriate, you can declare a variable and assign a value to it in a single statement. </a:t>
+            </a:r>
+            <a:endParaRPr lang="en-IN" dirty="0" smtClean="0"/>
+          </a:p>
+          <a:p>
+            <a:r>
+              <a:rPr lang="en-IN" dirty="0"/>
+              <a:t>In assignment expressions, the right-hand expression is contextually typed by the type of the left-hand expression.</a:t>
+            </a:r>
+            <a:endParaRPr lang="en-IN" dirty="0" smtClean="0"/>
+          </a:p>
+          <a:p>
+            <a:endParaRPr lang="en-IN" dirty="0"/>
+          </a:p>
+        </p:txBody>
+      </p:sp>
+    </p:spTree>
+    <p:extLst>
+      <p:ext uri="{BB962C8B-B14F-4D97-AF65-F5344CB8AC3E}">
+        <p14:creationId xmlns:p14="http://schemas.microsoft.com/office/powerpoint/2010/main" val="4106557255"/>
+      </p:ext>
+    </p:extLst>
+  </p:cSld>
+  <p:clrMapOvr>
+    <a:masterClrMapping/>
+  </p:clrMapOvr>
+</p:sld>
+</file>
+
+<file path=ppt/slides/slide22.xml><?xml version="1.0" encoding="utf-8"?>
+<p:sld xmlns:a="http://schemas.openxmlformats.org/drawingml/2006/main" xmlns:r="http://schemas.openxmlformats.org/officeDocument/2006/relationships" xmlns:p="http://schemas.openxmlformats.org/presentationml/2006/main">
+  <p:cSld>
+    <p:spTree>
+      <p:nvGrpSpPr>
+        <p:cNvPr id="1" name=""/>
+        <p:cNvGrpSpPr/>
+        <p:nvPr/>
+      </p:nvGrpSpPr>
+      <p:grpSpPr>
+        <a:xfrm>
+          <a:off x="0" y="0"/>
+          <a:ext cx="0" cy="0"/>
+          <a:chOff x="0" y="0"/>
+          <a:chExt cx="0" cy="0"/>
+        </a:xfrm>
+      </p:grpSpPr>
+      <p:sp>
+        <p:nvSpPr>
+          <p:cNvPr id="2" name="Title 1"/>
+          <p:cNvSpPr>
+            <a:spLocks noGrp="1"/>
+          </p:cNvSpPr>
+          <p:nvPr>
+            <p:ph type="title"/>
+          </p:nvPr>
+        </p:nvSpPr>
+        <p:spPr>
+          <a:xfrm>
+            <a:off x="1416072" y="98947"/>
+            <a:ext cx="10018713" cy="1129352"/>
+          </a:xfrm>
+        </p:spPr>
+        <p:txBody>
+          <a:bodyPr/>
+          <a:lstStyle/>
+          <a:p>
+            <a:r>
+              <a:rPr lang="en-IN" dirty="0" smtClean="0"/>
+              <a:t>Assignment Statements in TypeScript</a:t>
+            </a:r>
+            <a:endParaRPr lang="en-IN" dirty="0"/>
+          </a:p>
+        </p:txBody>
+      </p:sp>
+      <p:graphicFrame>
+        <p:nvGraphicFramePr>
+          <p:cNvPr id="6" name="Content Placeholder 5"/>
+          <p:cNvGraphicFramePr>
+            <a:graphicFrameLocks noGrp="1"/>
+          </p:cNvGraphicFramePr>
+          <p:nvPr>
+            <p:ph idx="1"/>
+            <p:extLst>
+              <p:ext uri="{D42A27DB-BD31-4B8C-83A1-F6EECF244321}">
+                <p14:modId xmlns:p14="http://schemas.microsoft.com/office/powerpoint/2010/main" val="2478628526"/>
+              </p:ext>
+            </p:extLst>
+          </p:nvPr>
+        </p:nvGraphicFramePr>
+        <p:xfrm>
+          <a:off x="1965278" y="1228295"/>
+          <a:ext cx="9212237" cy="4817662"/>
+        </p:xfrm>
+        <a:graphic>
+          <a:graphicData uri="http://schemas.openxmlformats.org/drawingml/2006/table">
+            <a:tbl>
+              <a:tblPr/>
+              <a:tblGrid>
+                <a:gridCol w="1720893"/>
+                <a:gridCol w="1129516"/>
+                <a:gridCol w="6361828"/>
+              </a:tblGrid>
+              <a:tr h="481766">
+                <a:tc>
+                  <a:txBody>
+                    <a:bodyPr/>
+                    <a:lstStyle/>
+                    <a:p>
+                      <a:r>
+                        <a:rPr lang="en-IN" sz="1600" dirty="0" smtClean="0">
+                          <a:solidFill>
+                            <a:srgbClr val="FFFFFF"/>
+                          </a:solidFill>
+                          <a:effectLst/>
+                        </a:rPr>
+                        <a:t>Operator</a:t>
+                      </a:r>
+                      <a:endParaRPr lang="en-IN" sz="1600" dirty="0"/>
+                    </a:p>
+                  </a:txBody>
+                  <a:tcPr marL="31242" marR="31242" marT="15621" marB="15621" anchor="ctr">
+                    <a:lnL>
+                      <a:noFill/>
+                    </a:lnL>
+                    <a:lnR w="9525" cap="flat" cmpd="sng" algn="ctr">
+                      <a:solidFill>
+                        <a:srgbClr val="ABABAB"/>
+                      </a:solidFill>
+                      <a:prstDash val="dash"/>
+                      <a:round/>
+                      <a:headEnd type="none" w="med" len="med"/>
+                      <a:tailEnd type="none" w="med" len="med"/>
+                    </a:lnR>
+                    <a:lnT>
+                      <a:noFill/>
+                    </a:lnT>
+                    <a:lnB w="9525" cap="flat" cmpd="sng" algn="ctr">
+                      <a:solidFill>
+                        <a:srgbClr val="ABABAB"/>
+                      </a:solidFill>
+                      <a:prstDash val="dash"/>
+                      <a:round/>
+                      <a:headEnd type="none" w="med" len="med"/>
+                      <a:tailEnd type="none" w="med" len="med"/>
+                    </a:lnB>
+                    <a:solidFill>
+                      <a:srgbClr val="0270BF"/>
+                    </a:solidFill>
+                  </a:tcPr>
+                </a:tc>
+                <a:tc>
+                  <a:txBody>
+                    <a:bodyPr/>
+                    <a:lstStyle/>
+                    <a:p>
+                      <a:r>
+                        <a:rPr lang="en-IN" sz="1600">
+                          <a:solidFill>
+                            <a:srgbClr val="FFFFFF"/>
+                          </a:solidFill>
+                          <a:effectLst/>
+                        </a:rPr>
+                        <a:t>Same AS</a:t>
+                      </a:r>
+                      <a:endParaRPr lang="en-IN" sz="1600">
+                        <a:effectLst/>
+                      </a:endParaRPr>
+                    </a:p>
+                  </a:txBody>
+                  <a:tcPr marL="31242" marR="31242" marT="15621" marB="15621" anchor="ctr">
+                    <a:lnL w="9525" cap="flat" cmpd="sng" algn="ctr">
+                      <a:solidFill>
+                        <a:srgbClr val="ABABAB"/>
+                      </a:solidFill>
+                      <a:prstDash val="dash"/>
+                      <a:round/>
+                      <a:headEnd type="none" w="med" len="med"/>
+                      <a:tailEnd type="none" w="med" len="med"/>
+                    </a:lnL>
+                    <a:lnR w="9525" cap="flat" cmpd="sng" algn="ctr">
+                      <a:solidFill>
+                        <a:srgbClr val="ABABAB"/>
+                      </a:solidFill>
+                      <a:prstDash val="dash"/>
+                      <a:round/>
+                      <a:headEnd type="none" w="med" len="med"/>
+                      <a:tailEnd type="none" w="med" len="med"/>
+                    </a:lnR>
+                    <a:lnT w="9525" cap="flat" cmpd="sng" algn="ctr">
+                      <a:solidFill>
+                        <a:srgbClr val="ABABAB"/>
+                      </a:solidFill>
+                      <a:prstDash val="dash"/>
+                      <a:round/>
+                      <a:headEnd type="none" w="med" len="med"/>
+                      <a:tailEnd type="none" w="med" len="med"/>
+                    </a:lnT>
+                    <a:lnB w="9525" cap="flat" cmpd="sng" algn="ctr">
+                      <a:solidFill>
+                        <a:srgbClr val="ABABAB"/>
+                      </a:solidFill>
+                      <a:prstDash val="dash"/>
+                      <a:round/>
+                      <a:headEnd type="none" w="med" len="med"/>
+                      <a:tailEnd type="none" w="med" len="med"/>
+                    </a:lnB>
+                    <a:solidFill>
+                      <a:srgbClr val="0270BF"/>
+                    </a:solidFill>
+                  </a:tcPr>
+                </a:tc>
+                <a:tc>
+                  <a:txBody>
+                    <a:bodyPr/>
+                    <a:lstStyle/>
+                    <a:p>
+                      <a:r>
+                        <a:rPr lang="en-IN" sz="1600" dirty="0">
+                          <a:solidFill>
+                            <a:srgbClr val="FFFFFF"/>
+                          </a:solidFill>
+                          <a:effectLst/>
+                        </a:rPr>
+                        <a:t>Description</a:t>
+                      </a:r>
+                      <a:endParaRPr lang="en-IN" sz="1600" dirty="0">
+                        <a:effectLst/>
+                      </a:endParaRPr>
+                    </a:p>
+                  </a:txBody>
+                  <a:tcPr marL="31242" marR="31242" marT="15621" marB="15621" anchor="ctr">
+                    <a:lnL w="9525" cap="flat" cmpd="sng" algn="ctr">
+                      <a:solidFill>
+                        <a:srgbClr val="ABABAB"/>
+                      </a:solidFill>
+                      <a:prstDash val="dash"/>
+                      <a:round/>
+                      <a:headEnd type="none" w="med" len="med"/>
+                      <a:tailEnd type="none" w="med" len="med"/>
+                    </a:lnL>
+                    <a:lnR w="9525" cap="flat" cmpd="sng" algn="ctr">
+                      <a:solidFill>
+                        <a:srgbClr val="ABABAB"/>
+                      </a:solidFill>
+                      <a:prstDash val="dash"/>
+                      <a:round/>
+                      <a:headEnd type="none" w="med" len="med"/>
+                      <a:tailEnd type="none" w="med" len="med"/>
+                    </a:lnR>
+                    <a:lnT w="9525" cap="flat" cmpd="sng" algn="ctr">
+                      <a:solidFill>
+                        <a:srgbClr val="ABABAB"/>
+                      </a:solidFill>
+                      <a:prstDash val="dash"/>
+                      <a:round/>
+                      <a:headEnd type="none" w="med" len="med"/>
+                      <a:tailEnd type="none" w="med" len="med"/>
+                    </a:lnT>
+                    <a:lnB w="9525" cap="flat" cmpd="sng" algn="ctr">
+                      <a:solidFill>
+                        <a:srgbClr val="ABABAB"/>
+                      </a:solidFill>
+                      <a:prstDash val="dash"/>
+                      <a:round/>
+                      <a:headEnd type="none" w="med" len="med"/>
+                      <a:tailEnd type="none" w="med" len="med"/>
+                    </a:lnB>
+                    <a:solidFill>
+                      <a:srgbClr val="0270BF"/>
+                    </a:solidFill>
+                  </a:tcPr>
+                </a:tc>
+              </a:tr>
+              <a:tr h="626296">
+                <a:tc>
+                  <a:txBody>
+                    <a:bodyPr/>
+                    <a:lstStyle/>
+                    <a:p>
+                      <a:r>
+                        <a:rPr lang="en-IN" sz="1600">
+                          <a:effectLst/>
+                        </a:rPr>
+                        <a:t>x = y</a:t>
+                      </a:r>
+                    </a:p>
+                  </a:txBody>
+                  <a:tcPr marL="31242" marR="31242" marT="15621" marB="15621" anchor="ctr">
+                    <a:lnL w="9525" cap="flat" cmpd="sng" algn="ctr">
+                      <a:solidFill>
+                        <a:srgbClr val="ABABAB"/>
+                      </a:solidFill>
+                      <a:prstDash val="dash"/>
+                      <a:round/>
+                      <a:headEnd type="none" w="med" len="med"/>
+                      <a:tailEnd type="none" w="med" len="med"/>
+                    </a:lnL>
+                    <a:lnR w="9525" cap="flat" cmpd="sng" algn="ctr">
+                      <a:solidFill>
+                        <a:srgbClr val="ABABAB"/>
+                      </a:solidFill>
+                      <a:prstDash val="dash"/>
+                      <a:round/>
+                      <a:headEnd type="none" w="med" len="med"/>
+                      <a:tailEnd type="none" w="med" len="med"/>
+                    </a:lnR>
+                    <a:lnT w="9525" cap="flat" cmpd="sng" algn="ctr">
+                      <a:solidFill>
+                        <a:srgbClr val="ABABAB"/>
+                      </a:solidFill>
+                      <a:prstDash val="dash"/>
+                      <a:round/>
+                      <a:headEnd type="none" w="med" len="med"/>
+                      <a:tailEnd type="none" w="med" len="med"/>
+                    </a:lnT>
+                    <a:lnB w="9525" cap="flat" cmpd="sng" algn="ctr">
+                      <a:solidFill>
+                        <a:srgbClr val="ABABAB"/>
+                      </a:solidFill>
+                      <a:prstDash val="dash"/>
+                      <a:round/>
+                      <a:headEnd type="none" w="med" len="med"/>
+                      <a:tailEnd type="none" w="med" len="med"/>
+                    </a:lnB>
+                    <a:solidFill>
+                      <a:srgbClr val="FFFFFF"/>
+                    </a:solidFill>
+                  </a:tcPr>
+                </a:tc>
+                <a:tc>
+                  <a:txBody>
+                    <a:bodyPr/>
+                    <a:lstStyle/>
+                    <a:p>
+                      <a:r>
+                        <a:rPr lang="en-IN" sz="1600">
+                          <a:effectLst/>
+                        </a:rPr>
+                        <a:t>x = y</a:t>
+                      </a:r>
+                    </a:p>
+                  </a:txBody>
+                  <a:tcPr marL="31242" marR="31242" marT="15621" marB="15621" anchor="ctr">
+                    <a:lnL w="9525" cap="flat" cmpd="sng" algn="ctr">
+                      <a:solidFill>
+                        <a:srgbClr val="ABABAB"/>
+                      </a:solidFill>
+                      <a:prstDash val="dash"/>
+                      <a:round/>
+                      <a:headEnd type="none" w="med" len="med"/>
+                      <a:tailEnd type="none" w="med" len="med"/>
+                    </a:lnL>
+                    <a:lnR w="9525" cap="flat" cmpd="sng" algn="ctr">
+                      <a:solidFill>
+                        <a:srgbClr val="ABABAB"/>
+                      </a:solidFill>
+                      <a:prstDash val="dash"/>
+                      <a:round/>
+                      <a:headEnd type="none" w="med" len="med"/>
+                      <a:tailEnd type="none" w="med" len="med"/>
+                    </a:lnR>
+                    <a:lnT w="9525" cap="flat" cmpd="sng" algn="ctr">
+                      <a:solidFill>
+                        <a:srgbClr val="ABABAB"/>
+                      </a:solidFill>
+                      <a:prstDash val="dash"/>
+                      <a:round/>
+                      <a:headEnd type="none" w="med" len="med"/>
+                      <a:tailEnd type="none" w="med" len="med"/>
+                    </a:lnT>
+                    <a:lnB w="9525" cap="flat" cmpd="sng" algn="ctr">
+                      <a:solidFill>
+                        <a:srgbClr val="ABABAB"/>
+                      </a:solidFill>
+                      <a:prstDash val="dash"/>
+                      <a:round/>
+                      <a:headEnd type="none" w="med" len="med"/>
+                      <a:tailEnd type="none" w="med" len="med"/>
+                    </a:lnB>
+                    <a:solidFill>
+                      <a:srgbClr val="FFFFFF"/>
+                    </a:solidFill>
+                  </a:tcPr>
+                </a:tc>
+                <a:tc>
+                  <a:txBody>
+                    <a:bodyPr/>
+                    <a:lstStyle/>
+                    <a:p>
+                      <a:r>
+                        <a:rPr lang="en-IN" sz="1600">
+                          <a:effectLst/>
+                        </a:rPr>
+                        <a:t>Simple assignment operator; assigns the value from the right side operand to the left side operand</a:t>
+                      </a:r>
+                    </a:p>
+                  </a:txBody>
+                  <a:tcPr marL="31242" marR="31242" marT="15621" marB="15621" anchor="ctr">
+                    <a:lnL w="9525" cap="flat" cmpd="sng" algn="ctr">
+                      <a:solidFill>
+                        <a:srgbClr val="ABABAB"/>
+                      </a:solidFill>
+                      <a:prstDash val="dash"/>
+                      <a:round/>
+                      <a:headEnd type="none" w="med" len="med"/>
+                      <a:tailEnd type="none" w="med" len="med"/>
+                    </a:lnL>
+                    <a:lnR w="9525" cap="flat" cmpd="sng" algn="ctr">
+                      <a:solidFill>
+                        <a:srgbClr val="ABABAB"/>
+                      </a:solidFill>
+                      <a:prstDash val="dash"/>
+                      <a:round/>
+                      <a:headEnd type="none" w="med" len="med"/>
+                      <a:tailEnd type="none" w="med" len="med"/>
+                    </a:lnR>
+                    <a:lnT w="9525" cap="flat" cmpd="sng" algn="ctr">
+                      <a:solidFill>
+                        <a:srgbClr val="ABABAB"/>
+                      </a:solidFill>
+                      <a:prstDash val="dash"/>
+                      <a:round/>
+                      <a:headEnd type="none" w="med" len="med"/>
+                      <a:tailEnd type="none" w="med" len="med"/>
+                    </a:lnT>
+                    <a:lnB w="9525" cap="flat" cmpd="sng" algn="ctr">
+                      <a:solidFill>
+                        <a:srgbClr val="ABABAB"/>
+                      </a:solidFill>
+                      <a:prstDash val="dash"/>
+                      <a:round/>
+                      <a:headEnd type="none" w="med" len="med"/>
+                      <a:tailEnd type="none" w="med" len="med"/>
+                    </a:lnB>
+                    <a:solidFill>
+                      <a:srgbClr val="FFFFFF"/>
+                    </a:solidFill>
+                  </a:tcPr>
+                </a:tc>
+              </a:tr>
+              <a:tr h="626296">
+                <a:tc>
+                  <a:txBody>
+                    <a:bodyPr/>
+                    <a:lstStyle/>
+                    <a:p>
+                      <a:r>
+                        <a:rPr lang="en-IN" sz="1600">
+                          <a:effectLst/>
+                        </a:rPr>
+                        <a:t>x += y</a:t>
+                      </a:r>
+                    </a:p>
+                  </a:txBody>
+                  <a:tcPr marL="31242" marR="31242" marT="15621" marB="15621" anchor="ctr">
+                    <a:lnL w="9525" cap="flat" cmpd="sng" algn="ctr">
+                      <a:solidFill>
+                        <a:srgbClr val="ABABAB"/>
+                      </a:solidFill>
+                      <a:prstDash val="dash"/>
+                      <a:round/>
+                      <a:headEnd type="none" w="med" len="med"/>
+                      <a:tailEnd type="none" w="med" len="med"/>
+                    </a:lnL>
+                    <a:lnR w="9525" cap="flat" cmpd="sng" algn="ctr">
+                      <a:solidFill>
+                        <a:srgbClr val="ABABAB"/>
+                      </a:solidFill>
+                      <a:prstDash val="dash"/>
+                      <a:round/>
+                      <a:headEnd type="none" w="med" len="med"/>
+                      <a:tailEnd type="none" w="med" len="med"/>
+                    </a:lnR>
+                    <a:lnT w="9525" cap="flat" cmpd="sng" algn="ctr">
+                      <a:solidFill>
+                        <a:srgbClr val="ABABAB"/>
+                      </a:solidFill>
+                      <a:prstDash val="dash"/>
+                      <a:round/>
+                      <a:headEnd type="none" w="med" len="med"/>
+                      <a:tailEnd type="none" w="med" len="med"/>
+                    </a:lnT>
+                    <a:lnB w="9525" cap="flat" cmpd="sng" algn="ctr">
+                      <a:solidFill>
+                        <a:srgbClr val="ABABAB"/>
+                      </a:solidFill>
+                      <a:prstDash val="dash"/>
+                      <a:round/>
+                      <a:headEnd type="none" w="med" len="med"/>
+                      <a:tailEnd type="none" w="med" len="med"/>
+                    </a:lnB>
+                    <a:solidFill>
+                      <a:srgbClr val="FFFFFF"/>
+                    </a:solidFill>
+                  </a:tcPr>
+                </a:tc>
+                <a:tc>
+                  <a:txBody>
+                    <a:bodyPr/>
+                    <a:lstStyle/>
+                    <a:p>
+                      <a:r>
+                        <a:rPr lang="en-IN" sz="1600">
+                          <a:effectLst/>
+                        </a:rPr>
+                        <a:t>x =x + y</a:t>
+                      </a:r>
+                    </a:p>
+                  </a:txBody>
+                  <a:tcPr marL="31242" marR="31242" marT="15621" marB="15621" anchor="ctr">
+                    <a:lnL w="9525" cap="flat" cmpd="sng" algn="ctr">
+                      <a:solidFill>
+                        <a:srgbClr val="ABABAB"/>
+                      </a:solidFill>
+                      <a:prstDash val="dash"/>
+                      <a:round/>
+                      <a:headEnd type="none" w="med" len="med"/>
+                      <a:tailEnd type="none" w="med" len="med"/>
+                    </a:lnL>
+                    <a:lnR w="9525" cap="flat" cmpd="sng" algn="ctr">
+                      <a:solidFill>
+                        <a:srgbClr val="ABABAB"/>
+                      </a:solidFill>
+                      <a:prstDash val="dash"/>
+                      <a:round/>
+                      <a:headEnd type="none" w="med" len="med"/>
+                      <a:tailEnd type="none" w="med" len="med"/>
+                    </a:lnR>
+                    <a:lnT w="9525" cap="flat" cmpd="sng" algn="ctr">
+                      <a:solidFill>
+                        <a:srgbClr val="ABABAB"/>
+                      </a:solidFill>
+                      <a:prstDash val="dash"/>
+                      <a:round/>
+                      <a:headEnd type="none" w="med" len="med"/>
+                      <a:tailEnd type="none" w="med" len="med"/>
+                    </a:lnT>
+                    <a:lnB w="9525" cap="flat" cmpd="sng" algn="ctr">
+                      <a:solidFill>
+                        <a:srgbClr val="ABABAB"/>
+                      </a:solidFill>
+                      <a:prstDash val="dash"/>
+                      <a:round/>
+                      <a:headEnd type="none" w="med" len="med"/>
+                      <a:tailEnd type="none" w="med" len="med"/>
+                    </a:lnB>
+                    <a:solidFill>
+                      <a:srgbClr val="FFFFFF"/>
+                    </a:solidFill>
+                  </a:tcPr>
+                </a:tc>
+                <a:tc>
+                  <a:txBody>
+                    <a:bodyPr/>
+                    <a:lstStyle/>
+                    <a:p>
+                      <a:r>
+                        <a:rPr lang="en-IN" sz="1600" dirty="0">
+                          <a:effectLst/>
+                        </a:rPr>
+                        <a:t>Add AND assignment operator; it adds the right operand to the left operand and assigns the result to the left operand</a:t>
+                      </a:r>
+                    </a:p>
+                  </a:txBody>
+                  <a:tcPr marL="31242" marR="31242" marT="15621" marB="15621" anchor="ctr">
+                    <a:lnL w="9525" cap="flat" cmpd="sng" algn="ctr">
+                      <a:solidFill>
+                        <a:srgbClr val="ABABAB"/>
+                      </a:solidFill>
+                      <a:prstDash val="dash"/>
+                      <a:round/>
+                      <a:headEnd type="none" w="med" len="med"/>
+                      <a:tailEnd type="none" w="med" len="med"/>
+                    </a:lnL>
+                    <a:lnR w="9525" cap="flat" cmpd="sng" algn="ctr">
+                      <a:solidFill>
+                        <a:srgbClr val="ABABAB"/>
+                      </a:solidFill>
+                      <a:prstDash val="dash"/>
+                      <a:round/>
+                      <a:headEnd type="none" w="med" len="med"/>
+                      <a:tailEnd type="none" w="med" len="med"/>
+                    </a:lnR>
+                    <a:lnT w="9525" cap="flat" cmpd="sng" algn="ctr">
+                      <a:solidFill>
+                        <a:srgbClr val="ABABAB"/>
+                      </a:solidFill>
+                      <a:prstDash val="dash"/>
+                      <a:round/>
+                      <a:headEnd type="none" w="med" len="med"/>
+                      <a:tailEnd type="none" w="med" len="med"/>
+                    </a:lnT>
+                    <a:lnB w="9525" cap="flat" cmpd="sng" algn="ctr">
+                      <a:solidFill>
+                        <a:srgbClr val="ABABAB"/>
+                      </a:solidFill>
+                      <a:prstDash val="dash"/>
+                      <a:round/>
+                      <a:headEnd type="none" w="med" len="med"/>
+                      <a:tailEnd type="none" w="med" len="med"/>
+                    </a:lnB>
+                    <a:solidFill>
+                      <a:srgbClr val="FFFFFF"/>
+                    </a:solidFill>
+                  </a:tcPr>
+                </a:tc>
+              </a:tr>
+              <a:tr h="770826">
+                <a:tc>
+                  <a:txBody>
+                    <a:bodyPr/>
+                    <a:lstStyle/>
+                    <a:p>
+                      <a:r>
+                        <a:rPr lang="en-IN" sz="1600" dirty="0">
+                          <a:effectLst/>
+                        </a:rPr>
+                        <a:t>x -= y</a:t>
+                      </a:r>
+                    </a:p>
+                  </a:txBody>
+                  <a:tcPr marL="31242" marR="31242" marT="15621" marB="15621" anchor="ctr">
+                    <a:lnL w="9525" cap="flat" cmpd="sng" algn="ctr">
+                      <a:solidFill>
+                        <a:srgbClr val="ABABAB"/>
+                      </a:solidFill>
+                      <a:prstDash val="dash"/>
+                      <a:round/>
+                      <a:headEnd type="none" w="med" len="med"/>
+                      <a:tailEnd type="none" w="med" len="med"/>
+                    </a:lnL>
+                    <a:lnR w="9525" cap="flat" cmpd="sng" algn="ctr">
+                      <a:solidFill>
+                        <a:srgbClr val="ABABAB"/>
+                      </a:solidFill>
+                      <a:prstDash val="dash"/>
+                      <a:round/>
+                      <a:headEnd type="none" w="med" len="med"/>
+                      <a:tailEnd type="none" w="med" len="med"/>
+                    </a:lnR>
+                    <a:lnT w="9525" cap="flat" cmpd="sng" algn="ctr">
+                      <a:solidFill>
+                        <a:srgbClr val="ABABAB"/>
+                      </a:solidFill>
+                      <a:prstDash val="dash"/>
+                      <a:round/>
+                      <a:headEnd type="none" w="med" len="med"/>
+                      <a:tailEnd type="none" w="med" len="med"/>
+                    </a:lnT>
+                    <a:lnB w="9525" cap="flat" cmpd="sng" algn="ctr">
+                      <a:solidFill>
+                        <a:srgbClr val="ABABAB"/>
+                      </a:solidFill>
+                      <a:prstDash val="dash"/>
+                      <a:round/>
+                      <a:headEnd type="none" w="med" len="med"/>
+                      <a:tailEnd type="none" w="med" len="med"/>
+                    </a:lnB>
+                    <a:solidFill>
+                      <a:srgbClr val="FFFFFF"/>
+                    </a:solidFill>
+                  </a:tcPr>
+                </a:tc>
+                <a:tc>
+                  <a:txBody>
+                    <a:bodyPr/>
+                    <a:lstStyle/>
+                    <a:p>
+                      <a:r>
+                        <a:rPr lang="en-IN" sz="1600" dirty="0">
+                          <a:effectLst/>
+                        </a:rPr>
+                        <a:t>x =x - y</a:t>
+                      </a:r>
+                    </a:p>
+                  </a:txBody>
+                  <a:tcPr marL="31242" marR="31242" marT="15621" marB="15621" anchor="ctr">
+                    <a:lnL w="9525" cap="flat" cmpd="sng" algn="ctr">
+                      <a:solidFill>
+                        <a:srgbClr val="ABABAB"/>
+                      </a:solidFill>
+                      <a:prstDash val="dash"/>
+                      <a:round/>
+                      <a:headEnd type="none" w="med" len="med"/>
+                      <a:tailEnd type="none" w="med" len="med"/>
+                    </a:lnL>
+                    <a:lnR w="9525" cap="flat" cmpd="sng" algn="ctr">
+                      <a:solidFill>
+                        <a:srgbClr val="ABABAB"/>
+                      </a:solidFill>
+                      <a:prstDash val="dash"/>
+                      <a:round/>
+                      <a:headEnd type="none" w="med" len="med"/>
+                      <a:tailEnd type="none" w="med" len="med"/>
+                    </a:lnR>
+                    <a:lnT w="9525" cap="flat" cmpd="sng" algn="ctr">
+                      <a:solidFill>
+                        <a:srgbClr val="ABABAB"/>
+                      </a:solidFill>
+                      <a:prstDash val="dash"/>
+                      <a:round/>
+                      <a:headEnd type="none" w="med" len="med"/>
+                      <a:tailEnd type="none" w="med" len="med"/>
+                    </a:lnT>
+                    <a:lnB w="9525" cap="flat" cmpd="sng" algn="ctr">
+                      <a:solidFill>
+                        <a:srgbClr val="ABABAB"/>
+                      </a:solidFill>
+                      <a:prstDash val="dash"/>
+                      <a:round/>
+                      <a:headEnd type="none" w="med" len="med"/>
+                      <a:tailEnd type="none" w="med" len="med"/>
+                    </a:lnB>
+                    <a:solidFill>
+                      <a:srgbClr val="FFFFFF"/>
+                    </a:solidFill>
+                  </a:tcPr>
+                </a:tc>
+                <a:tc>
+                  <a:txBody>
+                    <a:bodyPr/>
+                    <a:lstStyle/>
+                    <a:p>
+                      <a:r>
+                        <a:rPr lang="en-IN" sz="1600" dirty="0">
+                          <a:effectLst/>
+                        </a:rPr>
+                        <a:t>Subtract AND assignment operator; it subtracts the right operand from the left operand and assigns the result to the left operand</a:t>
+                      </a:r>
+                    </a:p>
+                  </a:txBody>
+                  <a:tcPr marL="31242" marR="31242" marT="15621" marB="15621" anchor="ctr">
+                    <a:lnL w="9525" cap="flat" cmpd="sng" algn="ctr">
+                      <a:solidFill>
+                        <a:srgbClr val="ABABAB"/>
+                      </a:solidFill>
+                      <a:prstDash val="dash"/>
+                      <a:round/>
+                      <a:headEnd type="none" w="med" len="med"/>
+                      <a:tailEnd type="none" w="med" len="med"/>
+                    </a:lnL>
+                    <a:lnR w="9525" cap="flat" cmpd="sng" algn="ctr">
+                      <a:solidFill>
+                        <a:srgbClr val="ABABAB"/>
+                      </a:solidFill>
+                      <a:prstDash val="dash"/>
+                      <a:round/>
+                      <a:headEnd type="none" w="med" len="med"/>
+                      <a:tailEnd type="none" w="med" len="med"/>
+                    </a:lnR>
+                    <a:lnT w="9525" cap="flat" cmpd="sng" algn="ctr">
+                      <a:solidFill>
+                        <a:srgbClr val="ABABAB"/>
+                      </a:solidFill>
+                      <a:prstDash val="dash"/>
+                      <a:round/>
+                      <a:headEnd type="none" w="med" len="med"/>
+                      <a:tailEnd type="none" w="med" len="med"/>
+                    </a:lnT>
+                    <a:lnB w="9525" cap="flat" cmpd="sng" algn="ctr">
+                      <a:solidFill>
+                        <a:srgbClr val="ABABAB"/>
+                      </a:solidFill>
+                      <a:prstDash val="dash"/>
+                      <a:round/>
+                      <a:headEnd type="none" w="med" len="med"/>
+                      <a:tailEnd type="none" w="med" len="med"/>
+                    </a:lnB>
+                    <a:solidFill>
+                      <a:srgbClr val="FFFFFF"/>
+                    </a:solidFill>
+                  </a:tcPr>
+                </a:tc>
+              </a:tr>
+              <a:tr h="770826">
+                <a:tc>
+                  <a:txBody>
+                    <a:bodyPr/>
+                    <a:lstStyle/>
+                    <a:p>
+                      <a:r>
+                        <a:rPr lang="en-IN" sz="1600">
+                          <a:effectLst/>
+                        </a:rPr>
+                        <a:t>x *= y</a:t>
+                      </a:r>
+                    </a:p>
+                  </a:txBody>
+                  <a:tcPr marL="31242" marR="31242" marT="15621" marB="15621" anchor="ctr">
+                    <a:lnL w="9525" cap="flat" cmpd="sng" algn="ctr">
+                      <a:solidFill>
+                        <a:srgbClr val="ABABAB"/>
+                      </a:solidFill>
+                      <a:prstDash val="dash"/>
+                      <a:round/>
+                      <a:headEnd type="none" w="med" len="med"/>
+                      <a:tailEnd type="none" w="med" len="med"/>
+                    </a:lnL>
+                    <a:lnR w="9525" cap="flat" cmpd="sng" algn="ctr">
+                      <a:solidFill>
+                        <a:srgbClr val="ABABAB"/>
+                      </a:solidFill>
+                      <a:prstDash val="dash"/>
+                      <a:round/>
+                      <a:headEnd type="none" w="med" len="med"/>
+                      <a:tailEnd type="none" w="med" len="med"/>
+                    </a:lnR>
+                    <a:lnT w="9525" cap="flat" cmpd="sng" algn="ctr">
+                      <a:solidFill>
+                        <a:srgbClr val="ABABAB"/>
+                      </a:solidFill>
+                      <a:prstDash val="dash"/>
+                      <a:round/>
+                      <a:headEnd type="none" w="med" len="med"/>
+                      <a:tailEnd type="none" w="med" len="med"/>
+                    </a:lnT>
+                    <a:lnB w="9525" cap="flat" cmpd="sng" algn="ctr">
+                      <a:solidFill>
+                        <a:srgbClr val="ABABAB"/>
+                      </a:solidFill>
+                      <a:prstDash val="dash"/>
+                      <a:round/>
+                      <a:headEnd type="none" w="med" len="med"/>
+                      <a:tailEnd type="none" w="med" len="med"/>
+                    </a:lnB>
+                    <a:solidFill>
+                      <a:srgbClr val="FFFFFF"/>
+                    </a:solidFill>
+                  </a:tcPr>
+                </a:tc>
+                <a:tc>
+                  <a:txBody>
+                    <a:bodyPr/>
+                    <a:lstStyle/>
+                    <a:p>
+                      <a:r>
+                        <a:rPr lang="en-IN" sz="1600">
+                          <a:effectLst/>
+                        </a:rPr>
+                        <a:t>x =x * y</a:t>
+                      </a:r>
+                    </a:p>
+                  </a:txBody>
+                  <a:tcPr marL="31242" marR="31242" marT="15621" marB="15621" anchor="ctr">
+                    <a:lnL w="9525" cap="flat" cmpd="sng" algn="ctr">
+                      <a:solidFill>
+                        <a:srgbClr val="ABABAB"/>
+                      </a:solidFill>
+                      <a:prstDash val="dash"/>
+                      <a:round/>
+                      <a:headEnd type="none" w="med" len="med"/>
+                      <a:tailEnd type="none" w="med" len="med"/>
+                    </a:lnL>
+                    <a:lnR w="9525" cap="flat" cmpd="sng" algn="ctr">
+                      <a:solidFill>
+                        <a:srgbClr val="ABABAB"/>
+                      </a:solidFill>
+                      <a:prstDash val="dash"/>
+                      <a:round/>
+                      <a:headEnd type="none" w="med" len="med"/>
+                      <a:tailEnd type="none" w="med" len="med"/>
+                    </a:lnR>
+                    <a:lnT w="9525" cap="flat" cmpd="sng" algn="ctr">
+                      <a:solidFill>
+                        <a:srgbClr val="ABABAB"/>
+                      </a:solidFill>
+                      <a:prstDash val="dash"/>
+                      <a:round/>
+                      <a:headEnd type="none" w="med" len="med"/>
+                      <a:tailEnd type="none" w="med" len="med"/>
+                    </a:lnT>
+                    <a:lnB w="9525" cap="flat" cmpd="sng" algn="ctr">
+                      <a:solidFill>
+                        <a:srgbClr val="ABABAB"/>
+                      </a:solidFill>
+                      <a:prstDash val="dash"/>
+                      <a:round/>
+                      <a:headEnd type="none" w="med" len="med"/>
+                      <a:tailEnd type="none" w="med" len="med"/>
+                    </a:lnB>
+                    <a:solidFill>
+                      <a:srgbClr val="FFFFFF"/>
+                    </a:solidFill>
+                  </a:tcPr>
+                </a:tc>
+                <a:tc>
+                  <a:txBody>
+                    <a:bodyPr/>
+                    <a:lstStyle/>
+                    <a:p>
+                      <a:r>
+                        <a:rPr lang="en-IN" sz="1600" dirty="0">
+                          <a:effectLst/>
+                        </a:rPr>
+                        <a:t>Multiply AND assignment operator; it multiplies the right operand with the left operand and assigns the result to the left operand</a:t>
+                      </a:r>
+                    </a:p>
+                  </a:txBody>
+                  <a:tcPr marL="31242" marR="31242" marT="15621" marB="15621" anchor="ctr">
+                    <a:lnL w="9525" cap="flat" cmpd="sng" algn="ctr">
+                      <a:solidFill>
+                        <a:srgbClr val="ABABAB"/>
+                      </a:solidFill>
+                      <a:prstDash val="dash"/>
+                      <a:round/>
+                      <a:headEnd type="none" w="med" len="med"/>
+                      <a:tailEnd type="none" w="med" len="med"/>
+                    </a:lnL>
+                    <a:lnR w="9525" cap="flat" cmpd="sng" algn="ctr">
+                      <a:solidFill>
+                        <a:srgbClr val="ABABAB"/>
+                      </a:solidFill>
+                      <a:prstDash val="dash"/>
+                      <a:round/>
+                      <a:headEnd type="none" w="med" len="med"/>
+                      <a:tailEnd type="none" w="med" len="med"/>
+                    </a:lnR>
+                    <a:lnT w="9525" cap="flat" cmpd="sng" algn="ctr">
+                      <a:solidFill>
+                        <a:srgbClr val="ABABAB"/>
+                      </a:solidFill>
+                      <a:prstDash val="dash"/>
+                      <a:round/>
+                      <a:headEnd type="none" w="med" len="med"/>
+                      <a:tailEnd type="none" w="med" len="med"/>
+                    </a:lnT>
+                    <a:lnB w="9525" cap="flat" cmpd="sng" algn="ctr">
+                      <a:solidFill>
+                        <a:srgbClr val="ABABAB"/>
+                      </a:solidFill>
+                      <a:prstDash val="dash"/>
+                      <a:round/>
+                      <a:headEnd type="none" w="med" len="med"/>
+                      <a:tailEnd type="none" w="med" len="med"/>
+                    </a:lnB>
+                    <a:solidFill>
+                      <a:srgbClr val="FFFFFF"/>
+                    </a:solidFill>
+                  </a:tcPr>
+                </a:tc>
+              </a:tr>
+              <a:tr h="770826">
+                <a:tc>
+                  <a:txBody>
+                    <a:bodyPr/>
+                    <a:lstStyle/>
+                    <a:p>
+                      <a:r>
+                        <a:rPr lang="en-IN" sz="1600">
+                          <a:effectLst/>
+                        </a:rPr>
+                        <a:t>x /= y</a:t>
+                      </a:r>
+                    </a:p>
+                  </a:txBody>
+                  <a:tcPr marL="31242" marR="31242" marT="15621" marB="15621" anchor="ctr">
+                    <a:lnL w="9525" cap="flat" cmpd="sng" algn="ctr">
+                      <a:solidFill>
+                        <a:srgbClr val="ABABAB"/>
+                      </a:solidFill>
+                      <a:prstDash val="dash"/>
+                      <a:round/>
+                      <a:headEnd type="none" w="med" len="med"/>
+                      <a:tailEnd type="none" w="med" len="med"/>
+                    </a:lnL>
+                    <a:lnR w="9525" cap="flat" cmpd="sng" algn="ctr">
+                      <a:solidFill>
+                        <a:srgbClr val="ABABAB"/>
+                      </a:solidFill>
+                      <a:prstDash val="dash"/>
+                      <a:round/>
+                      <a:headEnd type="none" w="med" len="med"/>
+                      <a:tailEnd type="none" w="med" len="med"/>
+                    </a:lnR>
+                    <a:lnT w="9525" cap="flat" cmpd="sng" algn="ctr">
+                      <a:solidFill>
+                        <a:srgbClr val="ABABAB"/>
+                      </a:solidFill>
+                      <a:prstDash val="dash"/>
+                      <a:round/>
+                      <a:headEnd type="none" w="med" len="med"/>
+                      <a:tailEnd type="none" w="med" len="med"/>
+                    </a:lnT>
+                    <a:lnB w="9525" cap="flat" cmpd="sng" algn="ctr">
+                      <a:solidFill>
+                        <a:srgbClr val="ABABAB"/>
+                      </a:solidFill>
+                      <a:prstDash val="dash"/>
+                      <a:round/>
+                      <a:headEnd type="none" w="med" len="med"/>
+                      <a:tailEnd type="none" w="med" len="med"/>
+                    </a:lnB>
+                    <a:solidFill>
+                      <a:srgbClr val="FFFFFF"/>
+                    </a:solidFill>
+                  </a:tcPr>
+                </a:tc>
+                <a:tc>
+                  <a:txBody>
+                    <a:bodyPr/>
+                    <a:lstStyle/>
+                    <a:p>
+                      <a:r>
+                        <a:rPr lang="en-IN" sz="1600">
+                          <a:effectLst/>
+                        </a:rPr>
+                        <a:t>x =x / y</a:t>
+                      </a:r>
+                    </a:p>
+                  </a:txBody>
+                  <a:tcPr marL="31242" marR="31242" marT="15621" marB="15621" anchor="ctr">
+                    <a:lnL w="9525" cap="flat" cmpd="sng" algn="ctr">
+                      <a:solidFill>
+                        <a:srgbClr val="ABABAB"/>
+                      </a:solidFill>
+                      <a:prstDash val="dash"/>
+                      <a:round/>
+                      <a:headEnd type="none" w="med" len="med"/>
+                      <a:tailEnd type="none" w="med" len="med"/>
+                    </a:lnL>
+                    <a:lnR w="9525" cap="flat" cmpd="sng" algn="ctr">
+                      <a:solidFill>
+                        <a:srgbClr val="ABABAB"/>
+                      </a:solidFill>
+                      <a:prstDash val="dash"/>
+                      <a:round/>
+                      <a:headEnd type="none" w="med" len="med"/>
+                      <a:tailEnd type="none" w="med" len="med"/>
+                    </a:lnR>
+                    <a:lnT w="9525" cap="flat" cmpd="sng" algn="ctr">
+                      <a:solidFill>
+                        <a:srgbClr val="ABABAB"/>
+                      </a:solidFill>
+                      <a:prstDash val="dash"/>
+                      <a:round/>
+                      <a:headEnd type="none" w="med" len="med"/>
+                      <a:tailEnd type="none" w="med" len="med"/>
+                    </a:lnT>
+                    <a:lnB w="9525" cap="flat" cmpd="sng" algn="ctr">
+                      <a:solidFill>
+                        <a:srgbClr val="ABABAB"/>
+                      </a:solidFill>
+                      <a:prstDash val="dash"/>
+                      <a:round/>
+                      <a:headEnd type="none" w="med" len="med"/>
+                      <a:tailEnd type="none" w="med" len="med"/>
+                    </a:lnB>
+                    <a:solidFill>
+                      <a:srgbClr val="FFFFFF"/>
+                    </a:solidFill>
+                  </a:tcPr>
+                </a:tc>
+                <a:tc>
+                  <a:txBody>
+                    <a:bodyPr/>
+                    <a:lstStyle/>
+                    <a:p>
+                      <a:r>
+                        <a:rPr lang="en-IN" sz="1600">
+                          <a:effectLst/>
+                        </a:rPr>
+                        <a:t>Divide AND assignment operator; it divides the left operand by the right operand and assigns the result to the left operand</a:t>
+                      </a:r>
+                    </a:p>
+                  </a:txBody>
+                  <a:tcPr marL="31242" marR="31242" marT="15621" marB="15621" anchor="ctr">
+                    <a:lnL w="9525" cap="flat" cmpd="sng" algn="ctr">
+                      <a:solidFill>
+                        <a:srgbClr val="ABABAB"/>
+                      </a:solidFill>
+                      <a:prstDash val="dash"/>
+                      <a:round/>
+                      <a:headEnd type="none" w="med" len="med"/>
+                      <a:tailEnd type="none" w="med" len="med"/>
+                    </a:lnL>
+                    <a:lnR w="9525" cap="flat" cmpd="sng" algn="ctr">
+                      <a:solidFill>
+                        <a:srgbClr val="ABABAB"/>
+                      </a:solidFill>
+                      <a:prstDash val="dash"/>
+                      <a:round/>
+                      <a:headEnd type="none" w="med" len="med"/>
+                      <a:tailEnd type="none" w="med" len="med"/>
+                    </a:lnR>
+                    <a:lnT w="9525" cap="flat" cmpd="sng" algn="ctr">
+                      <a:solidFill>
+                        <a:srgbClr val="ABABAB"/>
+                      </a:solidFill>
+                      <a:prstDash val="dash"/>
+                      <a:round/>
+                      <a:headEnd type="none" w="med" len="med"/>
+                      <a:tailEnd type="none" w="med" len="med"/>
+                    </a:lnT>
+                    <a:lnB w="9525" cap="flat" cmpd="sng" algn="ctr">
+                      <a:solidFill>
+                        <a:srgbClr val="ABABAB"/>
+                      </a:solidFill>
+                      <a:prstDash val="dash"/>
+                      <a:round/>
+                      <a:headEnd type="none" w="med" len="med"/>
+                      <a:tailEnd type="none" w="med" len="med"/>
+                    </a:lnB>
+                    <a:solidFill>
+                      <a:srgbClr val="FFFFFF"/>
+                    </a:solidFill>
+                  </a:tcPr>
+                </a:tc>
+              </a:tr>
+              <a:tr h="770826">
+                <a:tc>
+                  <a:txBody>
+                    <a:bodyPr/>
+                    <a:lstStyle/>
+                    <a:p>
+                      <a:r>
+                        <a:rPr lang="en-IN" sz="1600">
+                          <a:effectLst/>
+                        </a:rPr>
+                        <a:t>x %= y</a:t>
+                      </a:r>
+                    </a:p>
+                  </a:txBody>
+                  <a:tcPr marL="31242" marR="31242" marT="15621" marB="15621" anchor="ctr">
+                    <a:lnL w="9525" cap="flat" cmpd="sng" algn="ctr">
+                      <a:solidFill>
+                        <a:srgbClr val="ABABAB"/>
+                      </a:solidFill>
+                      <a:prstDash val="dash"/>
+                      <a:round/>
+                      <a:headEnd type="none" w="med" len="med"/>
+                      <a:tailEnd type="none" w="med" len="med"/>
+                    </a:lnL>
+                    <a:lnR w="9525" cap="flat" cmpd="sng" algn="ctr">
+                      <a:solidFill>
+                        <a:srgbClr val="ABABAB"/>
+                      </a:solidFill>
+                      <a:prstDash val="dash"/>
+                      <a:round/>
+                      <a:headEnd type="none" w="med" len="med"/>
+                      <a:tailEnd type="none" w="med" len="med"/>
+                    </a:lnR>
+                    <a:lnT w="9525" cap="flat" cmpd="sng" algn="ctr">
+                      <a:solidFill>
+                        <a:srgbClr val="ABABAB"/>
+                      </a:solidFill>
+                      <a:prstDash val="dash"/>
+                      <a:round/>
+                      <a:headEnd type="none" w="med" len="med"/>
+                      <a:tailEnd type="none" w="med" len="med"/>
+                    </a:lnT>
+                    <a:lnB w="9525" cap="flat" cmpd="sng" algn="ctr">
+                      <a:solidFill>
+                        <a:srgbClr val="ABABAB"/>
+                      </a:solidFill>
+                      <a:prstDash val="dash"/>
+                      <a:round/>
+                      <a:headEnd type="none" w="med" len="med"/>
+                      <a:tailEnd type="none" w="med" len="med"/>
+                    </a:lnB>
+                    <a:solidFill>
+                      <a:srgbClr val="FFFFFF"/>
+                    </a:solidFill>
+                  </a:tcPr>
+                </a:tc>
+                <a:tc>
+                  <a:txBody>
+                    <a:bodyPr/>
+                    <a:lstStyle/>
+                    <a:p>
+                      <a:r>
+                        <a:rPr lang="en-IN" sz="1600" dirty="0">
+                          <a:effectLst/>
+                        </a:rPr>
+                        <a:t>x =x % y</a:t>
+                      </a:r>
+                    </a:p>
+                  </a:txBody>
+                  <a:tcPr marL="31242" marR="31242" marT="15621" marB="15621" anchor="ctr">
+                    <a:lnL w="9525" cap="flat" cmpd="sng" algn="ctr">
+                      <a:solidFill>
+                        <a:srgbClr val="ABABAB"/>
+                      </a:solidFill>
+                      <a:prstDash val="dash"/>
+                      <a:round/>
+                      <a:headEnd type="none" w="med" len="med"/>
+                      <a:tailEnd type="none" w="med" len="med"/>
+                    </a:lnL>
+                    <a:lnR w="9525" cap="flat" cmpd="sng" algn="ctr">
+                      <a:solidFill>
+                        <a:srgbClr val="ABABAB"/>
+                      </a:solidFill>
+                      <a:prstDash val="dash"/>
+                      <a:round/>
+                      <a:headEnd type="none" w="med" len="med"/>
+                      <a:tailEnd type="none" w="med" len="med"/>
+                    </a:lnR>
+                    <a:lnT w="9525" cap="flat" cmpd="sng" algn="ctr">
+                      <a:solidFill>
+                        <a:srgbClr val="ABABAB"/>
+                      </a:solidFill>
+                      <a:prstDash val="dash"/>
+                      <a:round/>
+                      <a:headEnd type="none" w="med" len="med"/>
+                      <a:tailEnd type="none" w="med" len="med"/>
+                    </a:lnT>
+                    <a:lnB w="9525" cap="flat" cmpd="sng" algn="ctr">
+                      <a:solidFill>
+                        <a:srgbClr val="ABABAB"/>
+                      </a:solidFill>
+                      <a:prstDash val="dash"/>
+                      <a:round/>
+                      <a:headEnd type="none" w="med" len="med"/>
+                      <a:tailEnd type="none" w="med" len="med"/>
+                    </a:lnB>
+                    <a:solidFill>
+                      <a:srgbClr val="FFFFFF"/>
+                    </a:solidFill>
+                  </a:tcPr>
+                </a:tc>
+                <a:tc>
+                  <a:txBody>
+                    <a:bodyPr/>
+                    <a:lstStyle/>
+                    <a:p>
+                      <a:r>
+                        <a:rPr lang="en-IN" sz="1600" dirty="0">
+                          <a:effectLst/>
+                        </a:rPr>
+                        <a:t>Modulus AND assignment operator; it divides the left operand by the right operand and assigns the remainder to the left operand</a:t>
+                      </a:r>
+                    </a:p>
+                  </a:txBody>
+                  <a:tcPr marL="31242" marR="31242" marT="15621" marB="15621" anchor="ctr">
+                    <a:lnL w="9525" cap="flat" cmpd="sng" algn="ctr">
+                      <a:solidFill>
+                        <a:srgbClr val="ABABAB"/>
+                      </a:solidFill>
+                      <a:prstDash val="dash"/>
+                      <a:round/>
+                      <a:headEnd type="none" w="med" len="med"/>
+                      <a:tailEnd type="none" w="med" len="med"/>
+                    </a:lnL>
+                    <a:lnR w="9525" cap="flat" cmpd="sng" algn="ctr">
+                      <a:solidFill>
+                        <a:srgbClr val="ABABAB"/>
+                      </a:solidFill>
+                      <a:prstDash val="dash"/>
+                      <a:round/>
+                      <a:headEnd type="none" w="med" len="med"/>
+                      <a:tailEnd type="none" w="med" len="med"/>
+                    </a:lnR>
+                    <a:lnT w="9525" cap="flat" cmpd="sng" algn="ctr">
+                      <a:solidFill>
+                        <a:srgbClr val="ABABAB"/>
+                      </a:solidFill>
+                      <a:prstDash val="dash"/>
+                      <a:round/>
+                      <a:headEnd type="none" w="med" len="med"/>
+                      <a:tailEnd type="none" w="med" len="med"/>
+                    </a:lnT>
+                    <a:lnB w="9525" cap="flat" cmpd="sng" algn="ctr">
+                      <a:solidFill>
+                        <a:srgbClr val="ABABAB"/>
+                      </a:solidFill>
+                      <a:prstDash val="dash"/>
+                      <a:round/>
+                      <a:headEnd type="none" w="med" len="med"/>
+                      <a:tailEnd type="none" w="med" len="med"/>
+                    </a:lnB>
+                    <a:solidFill>
+                      <a:srgbClr val="FFFFFF"/>
+                    </a:solidFill>
+                  </a:tcPr>
+                </a:tc>
+              </a:tr>
+            </a:tbl>
+          </a:graphicData>
+        </a:graphic>
+      </p:graphicFrame>
+      <p:sp>
+        <p:nvSpPr>
+          <p:cNvPr id="7" name="Rectangle 1"/>
+          <p:cNvSpPr>
+            <a:spLocks noChangeArrowheads="1"/>
+          </p:cNvSpPr>
+          <p:nvPr/>
+        </p:nvSpPr>
+        <p:spPr bwMode="auto">
+          <a:xfrm>
+            <a:off x="-1583140" y="-228601"/>
+            <a:ext cx="12192000" cy="0"/>
+          </a:xfrm>
+          <a:prstGeom prst="rect">
+            <a:avLst/>
+          </a:prstGeom>
+          <a:solidFill>
+            <a:srgbClr val="FFFFFF"/>
+          </a:solidFill>
+          <a:ln>
+            <a:noFill/>
+          </a:ln>
+          <a:effectLst/>
+          <a:extLst>
+            <a:ext uri="{91240B29-F687-4F45-9708-019B960494DF}">
+              <a14:hiddenLine xmlns:a14="http://schemas.microsoft.com/office/drawing/2010/main" w="9525">
+                <a:solidFill>
+                  <a:schemeClr val="tx1"/>
+                </a:solidFill>
+                <a:miter lim="800000"/>
+                <a:headEnd/>
+                <a:tailEnd/>
+              </a14:hiddenLine>
+            </a:ext>
+            <a:ext uri="{AF507438-7753-43E0-B8FC-AC1667EBCBE1}">
+              <a14:hiddenEffects xmlns:a14="http://schemas.microsoft.com/office/drawing/2010/main">
+                <a:effectLst>
+                  <a:outerShdw dist="35921" dir="2700000" algn="ctr" rotWithShape="0">
+                    <a:schemeClr val="bg2"/>
+                  </a:outerShdw>
+                </a:effectLst>
+              </a14:hiddenEffects>
+            </a:ext>
+          </a:extLst>
+        </p:spPr>
+        <p:txBody>
+          <a:bodyPr vert="horz" wrap="none" lIns="91440" tIns="45720" rIns="91440" bIns="45720" numCol="1" anchor="ctr" anchorCtr="0" compatLnSpc="1">
+            <a:prstTxWarp prst="textNoShape">
+              <a:avLst/>
+            </a:prstTxWarp>
+            <a:spAutoFit/>
+          </a:bodyPr>
+          <a:lstStyle>
+            <a:lvl1pPr eaLnBrk="0" fontAlgn="base" hangingPunct="0">
+              <a:spcBef>
+                <a:spcPct val="0"/>
+              </a:spcBef>
+              <a:spcAft>
+                <a:spcPct val="0"/>
+              </a:spcAft>
+              <a:defRPr>
+                <a:solidFill>
+                  <a:schemeClr val="tx1"/>
+                </a:solidFill>
+                <a:latin typeface="Arial" panose="020B0604020202020204" pitchFamily="34" charset="0"/>
+              </a:defRPr>
+            </a:lvl1pPr>
+            <a:lvl2pPr eaLnBrk="0" fontAlgn="base" hangingPunct="0">
+              <a:spcBef>
+                <a:spcPct val="0"/>
+              </a:spcBef>
+              <a:spcAft>
+                <a:spcPct val="0"/>
+              </a:spcAft>
+              <a:defRPr>
+                <a:solidFill>
+                  <a:schemeClr val="tx1"/>
+                </a:solidFill>
+                <a:latin typeface="Arial" panose="020B0604020202020204" pitchFamily="34" charset="0"/>
+              </a:defRPr>
+            </a:lvl2pPr>
+            <a:lvl3pPr eaLnBrk="0" fontAlgn="base" hangingPunct="0">
+              <a:spcBef>
+                <a:spcPct val="0"/>
+              </a:spcBef>
+              <a:spcAft>
+                <a:spcPct val="0"/>
+              </a:spcAft>
+              <a:defRPr>
+                <a:solidFill>
+                  <a:schemeClr val="tx1"/>
+                </a:solidFill>
+                <a:latin typeface="Arial" panose="020B0604020202020204" pitchFamily="34" charset="0"/>
+              </a:defRPr>
+            </a:lvl3pPr>
+            <a:lvl4pPr eaLnBrk="0" fontAlgn="base" hangingPunct="0">
+              <a:spcBef>
+                <a:spcPct val="0"/>
+              </a:spcBef>
+              <a:spcAft>
+                <a:spcPct val="0"/>
+              </a:spcAft>
+              <a:defRPr>
+                <a:solidFill>
+                  <a:schemeClr val="tx1"/>
+                </a:solidFill>
+                <a:latin typeface="Arial" panose="020B0604020202020204" pitchFamily="34" charset="0"/>
+              </a:defRPr>
+            </a:lvl4pPr>
+            <a:lvl5pPr eaLnBrk="0" fontAlgn="base" hangingPunct="0">
+              <a:spcBef>
+                <a:spcPct val="0"/>
+              </a:spcBef>
+              <a:spcAft>
+                <a:spcPct val="0"/>
+              </a:spcAft>
+              <a:defRPr>
+                <a:solidFill>
+                  <a:schemeClr val="tx1"/>
+                </a:solidFill>
+                <a:latin typeface="Arial" panose="020B0604020202020204" pitchFamily="34" charset="0"/>
+              </a:defRPr>
+            </a:lvl5pPr>
+            <a:lvl6pPr eaLnBrk="0" fontAlgn="base" hangingPunct="0">
+              <a:spcBef>
+                <a:spcPct val="0"/>
+              </a:spcBef>
+              <a:spcAft>
+                <a:spcPct val="0"/>
+              </a:spcAft>
+              <a:defRPr>
+                <a:solidFill>
+                  <a:schemeClr val="tx1"/>
+                </a:solidFill>
+                <a:latin typeface="Arial" panose="020B0604020202020204" pitchFamily="34" charset="0"/>
+              </a:defRPr>
+            </a:lvl6pPr>
+            <a:lvl7pPr eaLnBrk="0" fontAlgn="base" hangingPunct="0">
+              <a:spcBef>
+                <a:spcPct val="0"/>
+              </a:spcBef>
+              <a:spcAft>
+                <a:spcPct val="0"/>
+              </a:spcAft>
+              <a:defRPr>
+                <a:solidFill>
+                  <a:schemeClr val="tx1"/>
+                </a:solidFill>
+                <a:latin typeface="Arial" panose="020B0604020202020204" pitchFamily="34" charset="0"/>
+              </a:defRPr>
+            </a:lvl7pPr>
+            <a:lvl8pPr eaLnBrk="0" fontAlgn="base" hangingPunct="0">
+              <a:spcBef>
+                <a:spcPct val="0"/>
+              </a:spcBef>
+              <a:spcAft>
+                <a:spcPct val="0"/>
+              </a:spcAft>
+              <a:defRPr>
+                <a:solidFill>
+                  <a:schemeClr val="tx1"/>
+                </a:solidFill>
+                <a:latin typeface="Arial" panose="020B0604020202020204" pitchFamily="34" charset="0"/>
+              </a:defRPr>
+            </a:lvl8pPr>
+            <a:lvl9pPr eaLnBrk="0" fontAlgn="base" hangingPunct="0">
+              <a:spcBef>
+                <a:spcPct val="0"/>
+              </a:spcBef>
+              <a:spcAft>
+                <a:spcPct val="0"/>
+              </a:spcAft>
+              <a:defRPr>
+                <a:solidFill>
+                  <a:schemeClr val="tx1"/>
+                </a:solidFill>
+                <a:latin typeface="Arial" panose="020B0604020202020204" pitchFamily="34" charset="0"/>
+              </a:defRPr>
+            </a:lvl9pPr>
+          </a:lstStyle>
+          <a:p>
+            <a:pPr marL="0" marR="0" lvl="0" indent="0" algn="l" defTabSz="914400" rtl="0" eaLnBrk="0" fontAlgn="base" latinLnBrk="0" hangingPunct="0">
+              <a:lnSpc>
+                <a:spcPct val="100000"/>
+              </a:lnSpc>
+              <a:spcBef>
+                <a:spcPct val="0"/>
+              </a:spcBef>
+              <a:spcAft>
+                <a:spcPct val="0"/>
+              </a:spcAft>
+              <a:buClrTx/>
+              <a:buSzTx/>
+              <a:buFontTx/>
+              <a:buNone/>
+              <a:tabLst/>
+            </a:pPr>
+            <a:r>
+              <a:rPr kumimoji="0" lang="en-US" sz="1200" b="0" i="0" u="none" strike="noStrike" cap="none" normalizeH="0" baseline="0" smtClean="0">
+                <a:ln>
+                  <a:noFill/>
+                </a:ln>
+                <a:solidFill>
+                  <a:srgbClr val="212121"/>
+                </a:solidFill>
+                <a:effectLst/>
+                <a:latin typeface="open sans"/>
+              </a:rPr>
+              <a:t>The Assignment operators are summarized in the following table.</a:t>
+            </a:r>
+            <a:endParaRPr kumimoji="0" lang="en-US" sz="1100" b="0" i="0" u="none" strike="noStrike" cap="none" normalizeH="0" baseline="0" smtClean="0">
+              <a:ln>
+                <a:noFill/>
+              </a:ln>
+              <a:solidFill>
+                <a:schemeClr val="tx1"/>
+              </a:solidFill>
+              <a:effectLst/>
+            </a:endParaRPr>
+          </a:p>
+          <a:p>
+            <a:pPr marL="0" marR="0" lvl="0" indent="0" algn="l" defTabSz="914400" rtl="0" eaLnBrk="0" fontAlgn="base" latinLnBrk="0" hangingPunct="0">
+              <a:lnSpc>
+                <a:spcPct val="100000"/>
+              </a:lnSpc>
+              <a:spcBef>
+                <a:spcPct val="0"/>
+              </a:spcBef>
+              <a:spcAft>
+                <a:spcPct val="0"/>
+              </a:spcAft>
+              <a:buClrTx/>
+              <a:buSzTx/>
+              <a:buFontTx/>
+              <a:buNone/>
+              <a:tabLst/>
+            </a:pPr>
+            <a:r>
+              <a:rPr kumimoji="0" lang="en-US" sz="1200" b="0" i="0" u="none" strike="noStrike" cap="none" normalizeH="0" baseline="0" smtClean="0">
+                <a:ln>
+                  <a:noFill/>
+                </a:ln>
+                <a:solidFill>
+                  <a:srgbClr val="212121"/>
+                </a:solidFill>
+                <a:effectLst/>
+                <a:latin typeface="open sans"/>
+              </a:rPr>
+              <a:t> </a:t>
+            </a:r>
+            <a:endParaRPr kumimoji="0" lang="en-US" sz="1100" b="0" i="0" u="none" strike="noStrike" cap="none" normalizeH="0" baseline="0" smtClean="0">
+              <a:ln>
+                <a:noFill/>
+              </a:ln>
+              <a:solidFill>
+                <a:schemeClr val="tx1"/>
+              </a:solidFill>
+              <a:effectLst/>
+            </a:endParaRPr>
+          </a:p>
+          <a:p>
+            <a:pPr marL="0" marR="0" lvl="0" indent="0" algn="l" defTabSz="914400" rtl="0" eaLnBrk="0" fontAlgn="base" latinLnBrk="0" hangingPunct="0">
+              <a:lnSpc>
+                <a:spcPct val="100000"/>
+              </a:lnSpc>
+              <a:spcBef>
+                <a:spcPct val="0"/>
+              </a:spcBef>
+              <a:spcAft>
+                <a:spcPct val="0"/>
+              </a:spcAft>
+              <a:buClrTx/>
+              <a:buSzTx/>
+              <a:buFontTx/>
+              <a:buNone/>
+              <a:tabLst/>
+            </a:pPr>
+            <a:endParaRPr kumimoji="0" lang="en-US" sz="1800" b="0" i="0" u="none" strike="noStrike" cap="none" normalizeH="0" baseline="0" smtClean="0">
+              <a:ln>
+                <a:noFill/>
+              </a:ln>
+              <a:solidFill>
+                <a:schemeClr val="tx1"/>
+              </a:solidFill>
+              <a:effectLst/>
+              <a:latin typeface="Arial" panose="020B0604020202020204" pitchFamily="34" charset="0"/>
+            </a:endParaRPr>
+          </a:p>
+        </p:txBody>
+      </p:sp>
+    </p:spTree>
+    <p:extLst>
+      <p:ext uri="{BB962C8B-B14F-4D97-AF65-F5344CB8AC3E}">
+        <p14:creationId xmlns:p14="http://schemas.microsoft.com/office/powerpoint/2010/main" val="577006904"/>
+      </p:ext>
+    </p:extLst>
+  </p:cSld>
+  <p:clrMapOvr>
+    <a:masterClrMapping/>
+  </p:clrMapOvr>
+</p:sld>
+</file>
+
 <file path=ppt/slides/slide3.xml><?xml version="1.0" encoding="utf-8"?>
 <p:sld xmlns:a="http://schemas.openxmlformats.org/drawingml/2006/main" xmlns:r="http://schemas.openxmlformats.org/officeDocument/2006/relationships" xmlns:p="http://schemas.openxmlformats.org/presentationml/2006/main">
   <p:cSld>
@@ -7614,7 +11558,6 @@
               <a:rPr lang="en-US" dirty="0" smtClean="0"/>
               <a:t>First Released: October 2012</a:t>
             </a:r>
-            <a:endParaRPr lang="en-US" dirty="0" smtClean="0"/>
           </a:p>
           <a:p>
             <a:pPr marL="0" indent="0">
@@ -7634,11 +11577,11 @@
   <p:clrMapOvr>
     <a:masterClrMapping/>
   </p:clrMapOvr>
-  <mc:AlternateContent xmlns:mc="http://schemas.openxmlformats.org/markup-compatibility/2006">
-    <mc:Choice xmlns:p14="http://schemas.microsoft.com/office/powerpoint/2010/main" Requires="p14">
+  <mc:AlternateContent xmlns:mc="http://schemas.openxmlformats.org/markup-compatibility/2006" xmlns:p14="http://schemas.microsoft.com/office/powerpoint/2010/main">
+    <mc:Choice Requires="p14">
       <p:transition p14:dur="10"/>
     </mc:Choice>
-    <mc:Fallback>
+    <mc:Fallback xmlns="">
       <p:transition/>
     </mc:Fallback>
   </mc:AlternateContent>
@@ -7879,11 +11822,11 @@
   <p:clrMapOvr>
     <a:masterClrMapping/>
   </p:clrMapOvr>
-  <mc:AlternateContent xmlns:mc="http://schemas.openxmlformats.org/markup-compatibility/2006">
-    <mc:Choice xmlns:p14="http://schemas.microsoft.com/office/powerpoint/2010/main" Requires="p14">
+  <mc:AlternateContent xmlns:mc="http://schemas.openxmlformats.org/markup-compatibility/2006" xmlns:p14="http://schemas.microsoft.com/office/powerpoint/2010/main">
+    <mc:Choice Requires="p14">
       <p:transition p14:dur="0"/>
     </mc:Choice>
-    <mc:Fallback>
+    <mc:Fallback xmlns="">
       <p:transition/>
     </mc:Fallback>
   </mc:AlternateContent>
@@ -8133,11 +12076,11 @@
   <p:clrMapOvr>
     <a:masterClrMapping/>
   </p:clrMapOvr>
-  <mc:AlternateContent xmlns:mc="http://schemas.openxmlformats.org/markup-compatibility/2006">
-    <mc:Choice xmlns:p14="http://schemas.microsoft.com/office/powerpoint/2010/main" Requires="p14">
+  <mc:AlternateContent xmlns:mc="http://schemas.openxmlformats.org/markup-compatibility/2006" xmlns:p14="http://schemas.microsoft.com/office/powerpoint/2010/main">
+    <mc:Choice Requires="p14">
       <p:transition p14:dur="0"/>
     </mc:Choice>
-    <mc:Fallback>
+    <mc:Fallback xmlns="">
       <p:transition/>
     </mc:Fallback>
   </mc:AlternateContent>
@@ -8296,11 +12239,7 @@
             </a:pPr>
             <a:r>
               <a:rPr lang="en-US" dirty="0"/>
-              <a:t> </a:t>
-            </a:r>
-            <a:r>
-              <a:rPr lang="en-US" dirty="0"/>
-              <a:t>	</a:t>
+              <a:t> 	</a:t>
             </a:r>
           </a:p>
           <a:p>
@@ -8318,11 +12257,11 @@
   <p:clrMapOvr>
     <a:masterClrMapping/>
   </p:clrMapOvr>
-  <mc:AlternateContent xmlns:mc="http://schemas.openxmlformats.org/markup-compatibility/2006">
-    <mc:Choice xmlns:p14="http://schemas.microsoft.com/office/powerpoint/2010/main" Requires="p14">
+  <mc:AlternateContent xmlns:mc="http://schemas.openxmlformats.org/markup-compatibility/2006" xmlns:p14="http://schemas.microsoft.com/office/powerpoint/2010/main">
+    <mc:Choice Requires="p14">
       <p:transition p14:dur="0"/>
     </mc:Choice>
-    <mc:Fallback>
+    <mc:Fallback xmlns="">
       <p:transition/>
     </mc:Fallback>
   </mc:AlternateContent>
@@ -9253,15 +13192,7 @@
             <a:pPr lvl="1"/>
             <a:r>
               <a:rPr lang="en-US" dirty="0"/>
-              <a:t>Th</a:t>
-            </a:r>
-            <a:r>
-              <a:rPr lang="en-US" dirty="0"/>
-              <a:t>i</a:t>
-            </a:r>
-            <a:r>
-              <a:rPr lang="en-US" dirty="0"/>
-              <a:t>s means that any variable that is </a:t>
+              <a:t>This means that any variable that is </a:t>
             </a:r>
             <a:r>
               <a:rPr lang="en-US" dirty="0" smtClean="0"/>

</xml_diff>